<commit_message>
Add architecture diagram for session 3.  Updated default resource group name for session 2.
</commit_message>
<xml_diff>
--- a/AzureX.pptx
+++ b/AzureX.pptx
@@ -6,6 +6,7 @@
   </p:sldMasterIdLst>
   <p:sldIdLst>
     <p:sldId id="256" r:id="rId2"/>
+    <p:sldId id="258" r:id="rId3"/>
   </p:sldIdLst>
   <p:sldSz cx="12192000" cy="6858000"/>
   <p:notesSz cx="6858000" cy="9144000"/>
@@ -2956,7 +2957,7 @@
         </p:nvSpPr>
         <p:spPr>
           <a:xfrm>
-            <a:off x="2172691" y="994303"/>
+            <a:off x="2172691" y="1194042"/>
             <a:ext cx="8050975" cy="4852426"/>
           </a:xfrm>
           <a:prstGeom prst="rect">
@@ -3004,7 +3005,7 @@
         </p:nvGrpSpPr>
         <p:grpSpPr>
           <a:xfrm>
-            <a:off x="3843062" y="3868593"/>
+            <a:off x="3843062" y="4068332"/>
             <a:ext cx="1992281" cy="1622527"/>
             <a:chOff x="2575869" y="4484869"/>
             <a:chExt cx="1992281" cy="1622527"/>
@@ -3261,7 +3262,7 @@
         </p:nvGrpSpPr>
         <p:grpSpPr>
           <a:xfrm>
-            <a:off x="872579" y="4459407"/>
+            <a:off x="872579" y="4659146"/>
             <a:ext cx="911287" cy="1078857"/>
             <a:chOff x="-6064" y="4930503"/>
             <a:chExt cx="911287" cy="1078857"/>
@@ -3343,7 +3344,7 @@
         </p:nvGrpSpPr>
         <p:grpSpPr>
           <a:xfrm>
-            <a:off x="3843062" y="1430917"/>
+            <a:off x="3843062" y="1630656"/>
             <a:ext cx="1992281" cy="2091191"/>
             <a:chOff x="1474990" y="987289"/>
             <a:chExt cx="1992281" cy="2091191"/>
@@ -3581,7 +3582,7 @@
         </p:nvGrpSpPr>
         <p:grpSpPr>
           <a:xfrm>
-            <a:off x="850599" y="2134518"/>
+            <a:off x="850599" y="2334257"/>
             <a:ext cx="955249" cy="926170"/>
             <a:chOff x="5618375" y="3424960"/>
             <a:chExt cx="955249" cy="926170"/>
@@ -3663,7 +3664,7 @@
         </p:nvGrpSpPr>
         <p:grpSpPr>
           <a:xfrm>
-            <a:off x="2306003" y="2134518"/>
+            <a:off x="2306003" y="2334257"/>
             <a:ext cx="1279006" cy="1411225"/>
             <a:chOff x="2857909" y="1544076"/>
             <a:chExt cx="1279006" cy="1411225"/>
@@ -3745,7 +3746,7 @@
         </p:nvGrpSpPr>
         <p:grpSpPr>
           <a:xfrm>
-            <a:off x="6424876" y="1431692"/>
+            <a:off x="6424876" y="1631431"/>
             <a:ext cx="3379089" cy="2114051"/>
             <a:chOff x="6816762" y="841250"/>
             <a:chExt cx="3379089" cy="2114051"/>
@@ -4065,7 +4066,7 @@
         </p:nvGrpSpPr>
         <p:grpSpPr>
           <a:xfrm>
-            <a:off x="10223667" y="2134518"/>
+            <a:off x="10223667" y="2334257"/>
             <a:ext cx="1513978" cy="1134226"/>
             <a:chOff x="10615553" y="1544076"/>
             <a:chExt cx="1513978" cy="1134226"/>
@@ -4150,7 +4151,7 @@
         </p:nvCxnSpPr>
         <p:spPr>
           <a:xfrm>
-            <a:off x="1718368" y="2524663"/>
+            <a:off x="1718368" y="2724402"/>
             <a:ext cx="836993" cy="0"/>
           </a:xfrm>
           <a:prstGeom prst="straightConnector1">
@@ -4188,7 +4189,7 @@
         </p:nvCxnSpPr>
         <p:spPr>
           <a:xfrm flipV="1">
-            <a:off x="3335651" y="2524418"/>
+            <a:off x="3335651" y="2724157"/>
             <a:ext cx="1138506" cy="245"/>
           </a:xfrm>
           <a:prstGeom prst="straightConnector1">
@@ -4226,7 +4227,7 @@
         </p:nvCxnSpPr>
         <p:spPr>
           <a:xfrm>
-            <a:off x="5254447" y="2524418"/>
+            <a:off x="5254447" y="2724157"/>
             <a:ext cx="1580007" cy="245"/>
           </a:xfrm>
           <a:prstGeom prst="straightConnector1">
@@ -4264,7 +4265,7 @@
         </p:nvCxnSpPr>
         <p:spPr>
           <a:xfrm>
-            <a:off x="7614744" y="2524663"/>
+            <a:off x="7614744" y="2724402"/>
             <a:ext cx="828035" cy="530"/>
           </a:xfrm>
           <a:prstGeom prst="straightConnector1">
@@ -4302,7 +4303,7 @@
         </p:nvCxnSpPr>
         <p:spPr>
           <a:xfrm flipV="1">
-            <a:off x="9223069" y="2524663"/>
+            <a:off x="9223069" y="2724402"/>
             <a:ext cx="1367442" cy="530"/>
           </a:xfrm>
           <a:prstGeom prst="straightConnector1">
@@ -4339,7 +4340,7 @@
         </p:nvCxnSpPr>
         <p:spPr>
           <a:xfrm>
-            <a:off x="1718368" y="4818273"/>
+            <a:off x="1718368" y="5018012"/>
             <a:ext cx="2709909" cy="0"/>
           </a:xfrm>
           <a:prstGeom prst="straightConnector1">
@@ -4373,7 +4374,7 @@
         </p:nvSpPr>
         <p:spPr>
           <a:xfrm>
-            <a:off x="1836068" y="4537013"/>
+            <a:off x="1836068" y="4736752"/>
             <a:ext cx="2404419" cy="584775"/>
           </a:xfrm>
           <a:prstGeom prst="rect">
@@ -4424,7 +4425,7 @@
         </p:nvSpPr>
         <p:spPr>
           <a:xfrm>
-            <a:off x="2172690" y="994302"/>
+            <a:off x="2172690" y="1194041"/>
             <a:ext cx="1664963" cy="369332"/>
           </a:xfrm>
           <a:prstGeom prst="rect">
@@ -4453,10 +4454,3464 @@
           </a:p>
         </p:txBody>
       </p:sp>
+      <p:sp>
+        <p:nvSpPr>
+          <p:cNvPr id="3" name="Title 2"/>
+          <p:cNvSpPr>
+            <a:spLocks noGrp="1"/>
+          </p:cNvSpPr>
+          <p:nvPr>
+            <p:ph type="title"/>
+          </p:nvPr>
+        </p:nvSpPr>
+        <p:spPr>
+          <a:xfrm>
+            <a:off x="9872" y="-6858"/>
+            <a:ext cx="12182128" cy="558415"/>
+          </a:xfrm>
+          <a:solidFill>
+            <a:schemeClr val="bg1">
+              <a:lumMod val="85000"/>
+            </a:schemeClr>
+          </a:solidFill>
+        </p:spPr>
+        <p:txBody>
+          <a:bodyPr>
+            <a:normAutofit fontScale="90000"/>
+          </a:bodyPr>
+          <a:lstStyle/>
+          <a:p>
+            <a:r>
+              <a:rPr lang="en-US" dirty="0"/>
+              <a:t>Azure X Session 2 Architecture</a:t>
+            </a:r>
+          </a:p>
+        </p:txBody>
+      </p:sp>
     </p:spTree>
     <p:extLst>
       <p:ext uri="{BB962C8B-B14F-4D97-AF65-F5344CB8AC3E}">
         <p14:creationId xmlns:p14="http://schemas.microsoft.com/office/powerpoint/2010/main" val="2749512263"/>
+      </p:ext>
+    </p:extLst>
+  </p:cSld>
+  <p:clrMapOvr>
+    <a:masterClrMapping/>
+  </p:clrMapOvr>
+</p:sld>
+</file>
+
+<file path=ppt/slides/slide2.xml><?xml version="1.0" encoding="utf-8"?>
+<p:sld xmlns:a="http://schemas.openxmlformats.org/drawingml/2006/main" xmlns:r="http://schemas.openxmlformats.org/officeDocument/2006/relationships" xmlns:p="http://schemas.openxmlformats.org/presentationml/2006/main">
+  <p:cSld>
+    <p:spTree>
+      <p:nvGrpSpPr>
+        <p:cNvPr id="1" name=""/>
+        <p:cNvGrpSpPr/>
+        <p:nvPr/>
+      </p:nvGrpSpPr>
+      <p:grpSpPr>
+        <a:xfrm>
+          <a:off x="0" y="0"/>
+          <a:ext cx="0" cy="0"/>
+          <a:chOff x="0" y="0"/>
+          <a:chExt cx="0" cy="0"/>
+        </a:xfrm>
+      </p:grpSpPr>
+      <p:sp>
+        <p:nvSpPr>
+          <p:cNvPr id="4" name="Title 2"/>
+          <p:cNvSpPr>
+            <a:spLocks noGrp="1"/>
+          </p:cNvSpPr>
+          <p:nvPr>
+            <p:ph type="title"/>
+          </p:nvPr>
+        </p:nvSpPr>
+        <p:spPr>
+          <a:xfrm>
+            <a:off x="0" y="-6858"/>
+            <a:ext cx="12192000" cy="558415"/>
+          </a:xfrm>
+          <a:solidFill>
+            <a:schemeClr val="bg1">
+              <a:lumMod val="85000"/>
+            </a:schemeClr>
+          </a:solidFill>
+        </p:spPr>
+        <p:txBody>
+          <a:bodyPr>
+            <a:normAutofit fontScale="90000"/>
+          </a:bodyPr>
+          <a:lstStyle/>
+          <a:p>
+            <a:r>
+              <a:rPr lang="en-US" dirty="0"/>
+              <a:t>Azure X Session 3 Architecture</a:t>
+            </a:r>
+          </a:p>
+        </p:txBody>
+      </p:sp>
+      <p:grpSp>
+        <p:nvGrpSpPr>
+          <p:cNvPr id="111" name="Group 110"/>
+          <p:cNvGrpSpPr/>
+          <p:nvPr/>
+        </p:nvGrpSpPr>
+        <p:grpSpPr>
+          <a:xfrm>
+            <a:off x="6798571" y="1451362"/>
+            <a:ext cx="5321029" cy="4694052"/>
+            <a:chOff x="6819471" y="1451362"/>
+            <a:chExt cx="5321029" cy="4694052"/>
+          </a:xfrm>
+        </p:grpSpPr>
+        <p:sp>
+          <p:nvSpPr>
+            <p:cNvPr id="7" name="Rectangle 6"/>
+            <p:cNvSpPr/>
+            <p:nvPr/>
+          </p:nvSpPr>
+          <p:spPr>
+            <a:xfrm>
+              <a:off x="6819471" y="1470908"/>
+              <a:ext cx="5321029" cy="4636068"/>
+            </a:xfrm>
+            <a:prstGeom prst="rect">
+              <a:avLst/>
+            </a:prstGeom>
+            <a:solidFill>
+              <a:schemeClr val="accent3">
+                <a:alpha val="21000"/>
+              </a:schemeClr>
+            </a:solidFill>
+            <a:ln w="19050">
+              <a:solidFill>
+                <a:schemeClr val="tx1">
+                  <a:lumMod val="65000"/>
+                  <a:lumOff val="35000"/>
+                </a:schemeClr>
+              </a:solidFill>
+              <a:prstDash val="solid"/>
+            </a:ln>
+          </p:spPr>
+          <p:style>
+            <a:lnRef idx="2">
+              <a:schemeClr val="accent1">
+                <a:shade val="50000"/>
+              </a:schemeClr>
+            </a:lnRef>
+            <a:fillRef idx="1">
+              <a:schemeClr val="accent1"/>
+            </a:fillRef>
+            <a:effectRef idx="0">
+              <a:schemeClr val="accent1"/>
+            </a:effectRef>
+            <a:fontRef idx="minor">
+              <a:schemeClr val="lt1"/>
+            </a:fontRef>
+          </p:style>
+          <p:txBody>
+            <a:bodyPr rtlCol="0" anchor="ctr"/>
+            <a:lstStyle/>
+            <a:p>
+              <a:pPr algn="ctr"/>
+              <a:endParaRPr lang="en-US"/>
+            </a:p>
+          </p:txBody>
+        </p:sp>
+        <p:sp>
+          <p:nvSpPr>
+            <p:cNvPr id="3" name="Rectangle 2"/>
+            <p:cNvSpPr/>
+            <p:nvPr/>
+          </p:nvSpPr>
+          <p:spPr>
+            <a:xfrm>
+              <a:off x="6893668" y="1838876"/>
+              <a:ext cx="5194569" cy="3232478"/>
+            </a:xfrm>
+            <a:prstGeom prst="rect">
+              <a:avLst/>
+            </a:prstGeom>
+            <a:solidFill>
+              <a:schemeClr val="accent1">
+                <a:alpha val="21000"/>
+              </a:schemeClr>
+            </a:solidFill>
+            <a:ln w="19050">
+              <a:prstDash val="dash"/>
+            </a:ln>
+          </p:spPr>
+          <p:style>
+            <a:lnRef idx="2">
+              <a:schemeClr val="accent1">
+                <a:shade val="50000"/>
+              </a:schemeClr>
+            </a:lnRef>
+            <a:fillRef idx="1">
+              <a:schemeClr val="accent1"/>
+            </a:fillRef>
+            <a:effectRef idx="0">
+              <a:schemeClr val="accent1"/>
+            </a:effectRef>
+            <a:fontRef idx="minor">
+              <a:schemeClr val="lt1"/>
+            </a:fontRef>
+          </p:style>
+          <p:txBody>
+            <a:bodyPr rtlCol="0" anchor="ctr"/>
+            <a:lstStyle/>
+            <a:p>
+              <a:pPr algn="ctr"/>
+              <a:endParaRPr lang="en-US"/>
+            </a:p>
+          </p:txBody>
+        </p:sp>
+        <p:sp>
+          <p:nvSpPr>
+            <p:cNvPr id="8" name="TextBox 7"/>
+            <p:cNvSpPr txBox="1"/>
+            <p:nvPr/>
+          </p:nvSpPr>
+          <p:spPr>
+            <a:xfrm>
+              <a:off x="6893668" y="1800438"/>
+              <a:ext cx="1410223" cy="307777"/>
+            </a:xfrm>
+            <a:prstGeom prst="rect">
+              <a:avLst/>
+            </a:prstGeom>
+            <a:noFill/>
+          </p:spPr>
+          <p:txBody>
+            <a:bodyPr wrap="square" rtlCol="0">
+              <a:spAutoFit/>
+            </a:bodyPr>
+            <a:lstStyle/>
+            <a:p>
+              <a:r>
+                <a:rPr lang="en-US" sz="1400" dirty="0">
+                  <a:solidFill>
+                    <a:schemeClr val="tx1">
+                      <a:lumMod val="65000"/>
+                      <a:lumOff val="35000"/>
+                    </a:schemeClr>
+                  </a:solidFill>
+                </a:rPr>
+                <a:t>Virtual Network</a:t>
+              </a:r>
+            </a:p>
+          </p:txBody>
+        </p:sp>
+        <p:sp>
+          <p:nvSpPr>
+            <p:cNvPr id="9" name="TextBox 8"/>
+            <p:cNvSpPr txBox="1"/>
+            <p:nvPr/>
+          </p:nvSpPr>
+          <p:spPr>
+            <a:xfrm>
+              <a:off x="6819471" y="1451362"/>
+              <a:ext cx="1673157" cy="307777"/>
+            </a:xfrm>
+            <a:prstGeom prst="rect">
+              <a:avLst/>
+            </a:prstGeom>
+            <a:noFill/>
+          </p:spPr>
+          <p:txBody>
+            <a:bodyPr wrap="square" rtlCol="0">
+              <a:spAutoFit/>
+            </a:bodyPr>
+            <a:lstStyle/>
+            <a:p>
+              <a:r>
+                <a:rPr lang="en-US" sz="1400" dirty="0">
+                  <a:solidFill>
+                    <a:schemeClr val="tx1">
+                      <a:lumMod val="65000"/>
+                      <a:lumOff val="35000"/>
+                    </a:schemeClr>
+                  </a:solidFill>
+                </a:rPr>
+                <a:t>East US Data Center</a:t>
+              </a:r>
+            </a:p>
+          </p:txBody>
+        </p:sp>
+        <p:grpSp>
+          <p:nvGrpSpPr>
+            <p:cNvPr id="38" name="Group 37"/>
+            <p:cNvGrpSpPr/>
+            <p:nvPr/>
+          </p:nvGrpSpPr>
+          <p:grpSpPr>
+            <a:xfrm>
+              <a:off x="7851518" y="2117988"/>
+              <a:ext cx="1616473" cy="1542765"/>
+              <a:chOff x="1146440" y="1203571"/>
+              <a:chExt cx="1616473" cy="1542765"/>
+            </a:xfrm>
+          </p:grpSpPr>
+          <p:pic>
+            <p:nvPicPr>
+              <p:cNvPr id="16" name="Picture 15"/>
+              <p:cNvPicPr>
+                <a:picLocks noChangeAspect="1"/>
+              </p:cNvPicPr>
+              <p:nvPr/>
+            </p:nvPicPr>
+            <p:blipFill>
+              <a:blip r:embed="rId2">
+                <a:extLst>
+                  <a:ext uri="{28A0092B-C50C-407E-A947-70E740481C1C}">
+                    <a14:useLocalDpi xmlns:a14="http://schemas.microsoft.com/office/drawing/2010/main" val="0"/>
+                  </a:ext>
+                </a:extLst>
+              </a:blip>
+              <a:stretch>
+                <a:fillRect/>
+              </a:stretch>
+            </p:blipFill>
+            <p:spPr>
+              <a:xfrm>
+                <a:off x="1501138" y="1711379"/>
+                <a:ext cx="569612" cy="569612"/>
+              </a:xfrm>
+              <a:prstGeom prst="rect">
+                <a:avLst/>
+              </a:prstGeom>
+            </p:spPr>
+          </p:pic>
+          <p:sp>
+            <p:nvSpPr>
+              <p:cNvPr id="17" name="TextBox 16"/>
+              <p:cNvSpPr txBox="1"/>
+              <p:nvPr/>
+            </p:nvSpPr>
+            <p:spPr>
+              <a:xfrm>
+                <a:off x="1146440" y="2222556"/>
+                <a:ext cx="1368481" cy="523220"/>
+              </a:xfrm>
+              <a:prstGeom prst="rect">
+                <a:avLst/>
+              </a:prstGeom>
+              <a:noFill/>
+            </p:spPr>
+            <p:txBody>
+              <a:bodyPr wrap="square" rtlCol="0">
+                <a:spAutoFit/>
+              </a:bodyPr>
+              <a:lstStyle/>
+              <a:p>
+                <a:pPr algn="ctr"/>
+                <a:r>
+                  <a:rPr lang="en-US" sz="1400" dirty="0">
+                    <a:solidFill>
+                      <a:schemeClr val="tx1">
+                        <a:lumMod val="65000"/>
+                        <a:lumOff val="35000"/>
+                      </a:schemeClr>
+                    </a:solidFill>
+                  </a:rPr>
+                  <a:t>Virtual Machine Scale Set</a:t>
+                </a:r>
+              </a:p>
+            </p:txBody>
+          </p:sp>
+          <p:pic>
+            <p:nvPicPr>
+              <p:cNvPr id="19" name="Picture 18"/>
+              <p:cNvPicPr>
+                <a:picLocks noChangeAspect="1"/>
+              </p:cNvPicPr>
+              <p:nvPr/>
+            </p:nvPicPr>
+            <p:blipFill>
+              <a:blip r:embed="rId3">
+                <a:extLst>
+                  <a:ext uri="{BEBA8EAE-BF5A-486C-A8C5-ECC9F3942E4B}">
+                    <a14:imgProps xmlns:a14="http://schemas.microsoft.com/office/drawing/2010/main">
+                      <a14:imgLayer r:embed="rId4">
+                        <a14:imgEffect>
+                          <a14:saturation sat="0"/>
+                        </a14:imgEffect>
+                      </a14:imgLayer>
+                    </a14:imgProps>
+                  </a:ext>
+                  <a:ext uri="{28A0092B-C50C-407E-A947-70E740481C1C}">
+                    <a14:useLocalDpi xmlns:a14="http://schemas.microsoft.com/office/drawing/2010/main" val="0"/>
+                  </a:ext>
+                </a:extLst>
+              </a:blip>
+              <a:stretch>
+                <a:fillRect/>
+              </a:stretch>
+            </p:blipFill>
+            <p:spPr>
+              <a:xfrm>
+                <a:off x="2331350" y="1289920"/>
+                <a:ext cx="366736" cy="366736"/>
+              </a:xfrm>
+              <a:prstGeom prst="rect">
+                <a:avLst/>
+              </a:prstGeom>
+            </p:spPr>
+          </p:pic>
+          <p:sp>
+            <p:nvSpPr>
+              <p:cNvPr id="20" name="Rectangle 19"/>
+              <p:cNvSpPr/>
+              <p:nvPr/>
+            </p:nvSpPr>
+            <p:spPr>
+              <a:xfrm>
+                <a:off x="1178825" y="1252602"/>
+                <a:ext cx="1519261" cy="1493734"/>
+              </a:xfrm>
+              <a:prstGeom prst="rect">
+                <a:avLst/>
+              </a:prstGeom>
+              <a:noFill/>
+              <a:ln>
+                <a:prstDash val="dash"/>
+              </a:ln>
+            </p:spPr>
+            <p:style>
+              <a:lnRef idx="2">
+                <a:schemeClr val="accent1">
+                  <a:shade val="50000"/>
+                </a:schemeClr>
+              </a:lnRef>
+              <a:fillRef idx="1">
+                <a:schemeClr val="accent1"/>
+              </a:fillRef>
+              <a:effectRef idx="0">
+                <a:schemeClr val="accent1"/>
+              </a:effectRef>
+              <a:fontRef idx="minor">
+                <a:schemeClr val="lt1"/>
+              </a:fontRef>
+            </p:style>
+            <p:txBody>
+              <a:bodyPr rtlCol="0" anchor="ctr"/>
+              <a:lstStyle/>
+              <a:p>
+                <a:pPr algn="ctr"/>
+                <a:endParaRPr lang="en-US"/>
+              </a:p>
+            </p:txBody>
+          </p:sp>
+          <p:sp>
+            <p:nvSpPr>
+              <p:cNvPr id="21" name="TextBox 20"/>
+              <p:cNvSpPr txBox="1"/>
+              <p:nvPr/>
+            </p:nvSpPr>
+            <p:spPr>
+              <a:xfrm>
+                <a:off x="1192576" y="1203571"/>
+                <a:ext cx="1531619" cy="307777"/>
+              </a:xfrm>
+              <a:prstGeom prst="rect">
+                <a:avLst/>
+              </a:prstGeom>
+              <a:noFill/>
+            </p:spPr>
+            <p:txBody>
+              <a:bodyPr wrap="square" rtlCol="0">
+                <a:spAutoFit/>
+              </a:bodyPr>
+              <a:lstStyle/>
+              <a:p>
+                <a:r>
+                  <a:rPr lang="en-US" sz="1400" dirty="0">
+                    <a:solidFill>
+                      <a:schemeClr val="tx1">
+                        <a:lumMod val="65000"/>
+                        <a:lumOff val="35000"/>
+                      </a:schemeClr>
+                    </a:solidFill>
+                  </a:rPr>
+                  <a:t>Web Subnet</a:t>
+                </a:r>
+              </a:p>
+            </p:txBody>
+          </p:sp>
+          <p:sp>
+            <p:nvSpPr>
+              <p:cNvPr id="23" name="TextBox 22"/>
+              <p:cNvSpPr txBox="1"/>
+              <p:nvPr/>
+            </p:nvSpPr>
+            <p:spPr>
+              <a:xfrm>
+                <a:off x="2266523" y="1609161"/>
+                <a:ext cx="496390" cy="307777"/>
+              </a:xfrm>
+              <a:prstGeom prst="rect">
+                <a:avLst/>
+              </a:prstGeom>
+              <a:noFill/>
+            </p:spPr>
+            <p:txBody>
+              <a:bodyPr wrap="square" rtlCol="0">
+                <a:spAutoFit/>
+              </a:bodyPr>
+              <a:lstStyle/>
+              <a:p>
+                <a:pPr algn="ctr"/>
+                <a:r>
+                  <a:rPr lang="en-US" sz="1400" dirty="0">
+                    <a:solidFill>
+                      <a:schemeClr val="tx1">
+                        <a:lumMod val="65000"/>
+                        <a:lumOff val="35000"/>
+                      </a:schemeClr>
+                    </a:solidFill>
+                  </a:rPr>
+                  <a:t>NSG</a:t>
+                </a:r>
+              </a:p>
+            </p:txBody>
+          </p:sp>
+        </p:grpSp>
+        <p:grpSp>
+          <p:nvGrpSpPr>
+            <p:cNvPr id="37" name="Group 36"/>
+            <p:cNvGrpSpPr/>
+            <p:nvPr/>
+          </p:nvGrpSpPr>
+          <p:grpSpPr>
+            <a:xfrm>
+              <a:off x="9363001" y="2138299"/>
+              <a:ext cx="2676852" cy="1519108"/>
+              <a:chOff x="4073031" y="1203571"/>
+              <a:chExt cx="2676852" cy="1519108"/>
+            </a:xfrm>
+          </p:grpSpPr>
+          <p:pic>
+            <p:nvPicPr>
+              <p:cNvPr id="25" name="Picture 24"/>
+              <p:cNvPicPr>
+                <a:picLocks noChangeAspect="1"/>
+              </p:cNvPicPr>
+              <p:nvPr/>
+            </p:nvPicPr>
+            <p:blipFill>
+              <a:blip r:embed="rId2">
+                <a:extLst>
+                  <a:ext uri="{28A0092B-C50C-407E-A947-70E740481C1C}">
+                    <a14:useLocalDpi xmlns:a14="http://schemas.microsoft.com/office/drawing/2010/main" val="0"/>
+                  </a:ext>
+                </a:extLst>
+              </a:blip>
+              <a:stretch>
+                <a:fillRect/>
+              </a:stretch>
+            </p:blipFill>
+            <p:spPr>
+              <a:xfrm>
+                <a:off x="5586911" y="1691924"/>
+                <a:ext cx="569612" cy="569612"/>
+              </a:xfrm>
+              <a:prstGeom prst="rect">
+                <a:avLst/>
+              </a:prstGeom>
+            </p:spPr>
+          </p:pic>
+          <p:sp>
+            <p:nvSpPr>
+              <p:cNvPr id="26" name="TextBox 25"/>
+              <p:cNvSpPr txBox="1"/>
+              <p:nvPr/>
+            </p:nvSpPr>
+            <p:spPr>
+              <a:xfrm>
+                <a:off x="5232213" y="2199459"/>
+                <a:ext cx="1368481" cy="523220"/>
+              </a:xfrm>
+              <a:prstGeom prst="rect">
+                <a:avLst/>
+              </a:prstGeom>
+              <a:noFill/>
+            </p:spPr>
+            <p:txBody>
+              <a:bodyPr wrap="square" rtlCol="0">
+                <a:spAutoFit/>
+              </a:bodyPr>
+              <a:lstStyle/>
+              <a:p>
+                <a:pPr algn="ctr"/>
+                <a:r>
+                  <a:rPr lang="en-US" sz="1400" dirty="0">
+                    <a:solidFill>
+                      <a:schemeClr val="tx1">
+                        <a:lumMod val="65000"/>
+                        <a:lumOff val="35000"/>
+                      </a:schemeClr>
+                    </a:solidFill>
+                  </a:rPr>
+                  <a:t>Virtual Machine Scale Set</a:t>
+                </a:r>
+              </a:p>
+            </p:txBody>
+          </p:sp>
+          <p:pic>
+            <p:nvPicPr>
+              <p:cNvPr id="27" name="Picture 26"/>
+              <p:cNvPicPr>
+                <a:picLocks noChangeAspect="1"/>
+              </p:cNvPicPr>
+              <p:nvPr/>
+            </p:nvPicPr>
+            <p:blipFill>
+              <a:blip r:embed="rId3">
+                <a:extLst>
+                  <a:ext uri="{BEBA8EAE-BF5A-486C-A8C5-ECC9F3942E4B}">
+                    <a14:imgProps xmlns:a14="http://schemas.microsoft.com/office/drawing/2010/main">
+                      <a14:imgLayer r:embed="rId4">
+                        <a14:imgEffect>
+                          <a14:saturation sat="0"/>
+                        </a14:imgEffect>
+                      </a14:imgLayer>
+                    </a14:imgProps>
+                  </a:ext>
+                  <a:ext uri="{28A0092B-C50C-407E-A947-70E740481C1C}">
+                    <a14:useLocalDpi xmlns:a14="http://schemas.microsoft.com/office/drawing/2010/main" val="0"/>
+                  </a:ext>
+                </a:extLst>
+              </a:blip>
+              <a:stretch>
+                <a:fillRect/>
+              </a:stretch>
+            </p:blipFill>
+            <p:spPr>
+              <a:xfrm>
+                <a:off x="6318320" y="1278890"/>
+                <a:ext cx="366736" cy="366736"/>
+              </a:xfrm>
+              <a:prstGeom prst="rect">
+                <a:avLst/>
+              </a:prstGeom>
+            </p:spPr>
+          </p:pic>
+          <p:sp>
+            <p:nvSpPr>
+              <p:cNvPr id="28" name="Rectangle 27"/>
+              <p:cNvSpPr/>
+              <p:nvPr/>
+            </p:nvSpPr>
+            <p:spPr>
+              <a:xfrm>
+                <a:off x="4176265" y="1228945"/>
+                <a:ext cx="2507145" cy="1493734"/>
+              </a:xfrm>
+              <a:prstGeom prst="rect">
+                <a:avLst/>
+              </a:prstGeom>
+              <a:noFill/>
+              <a:ln>
+                <a:prstDash val="dash"/>
+              </a:ln>
+            </p:spPr>
+            <p:style>
+              <a:lnRef idx="2">
+                <a:schemeClr val="accent1">
+                  <a:shade val="50000"/>
+                </a:schemeClr>
+              </a:lnRef>
+              <a:fillRef idx="1">
+                <a:schemeClr val="accent1"/>
+              </a:fillRef>
+              <a:effectRef idx="0">
+                <a:schemeClr val="accent1"/>
+              </a:effectRef>
+              <a:fontRef idx="minor">
+                <a:schemeClr val="lt1"/>
+              </a:fontRef>
+            </p:style>
+            <p:txBody>
+              <a:bodyPr rtlCol="0" anchor="ctr"/>
+              <a:lstStyle/>
+              <a:p>
+                <a:pPr algn="ctr"/>
+                <a:endParaRPr lang="en-US"/>
+              </a:p>
+            </p:txBody>
+          </p:sp>
+          <p:sp>
+            <p:nvSpPr>
+              <p:cNvPr id="29" name="TextBox 28"/>
+              <p:cNvSpPr txBox="1"/>
+              <p:nvPr/>
+            </p:nvSpPr>
+            <p:spPr>
+              <a:xfrm>
+                <a:off x="4190016" y="1203571"/>
+                <a:ext cx="1531619" cy="307777"/>
+              </a:xfrm>
+              <a:prstGeom prst="rect">
+                <a:avLst/>
+              </a:prstGeom>
+              <a:noFill/>
+            </p:spPr>
+            <p:txBody>
+              <a:bodyPr wrap="square" rtlCol="0">
+                <a:spAutoFit/>
+              </a:bodyPr>
+              <a:lstStyle/>
+              <a:p>
+                <a:r>
+                  <a:rPr lang="en-US" sz="1400" dirty="0">
+                    <a:solidFill>
+                      <a:schemeClr val="tx1">
+                        <a:lumMod val="65000"/>
+                        <a:lumOff val="35000"/>
+                      </a:schemeClr>
+                    </a:solidFill>
+                  </a:rPr>
+                  <a:t>Biz Subnet</a:t>
+                </a:r>
+              </a:p>
+            </p:txBody>
+          </p:sp>
+          <p:sp>
+            <p:nvSpPr>
+              <p:cNvPr id="30" name="TextBox 29"/>
+              <p:cNvSpPr txBox="1"/>
+              <p:nvPr/>
+            </p:nvSpPr>
+            <p:spPr>
+              <a:xfrm>
+                <a:off x="6253493" y="1598131"/>
+                <a:ext cx="496390" cy="307777"/>
+              </a:xfrm>
+              <a:prstGeom prst="rect">
+                <a:avLst/>
+              </a:prstGeom>
+              <a:noFill/>
+            </p:spPr>
+            <p:txBody>
+              <a:bodyPr wrap="square" rtlCol="0">
+                <a:spAutoFit/>
+              </a:bodyPr>
+              <a:lstStyle/>
+              <a:p>
+                <a:pPr algn="ctr"/>
+                <a:r>
+                  <a:rPr lang="en-US" sz="1400" dirty="0">
+                    <a:solidFill>
+                      <a:schemeClr val="tx1">
+                        <a:lumMod val="65000"/>
+                        <a:lumOff val="35000"/>
+                      </a:schemeClr>
+                    </a:solidFill>
+                  </a:rPr>
+                  <a:t>NSG</a:t>
+                </a:r>
+              </a:p>
+            </p:txBody>
+          </p:sp>
+          <p:pic>
+            <p:nvPicPr>
+              <p:cNvPr id="31" name="Picture 30"/>
+              <p:cNvPicPr>
+                <a:picLocks noChangeAspect="1"/>
+              </p:cNvPicPr>
+              <p:nvPr/>
+            </p:nvPicPr>
+            <p:blipFill>
+              <a:blip r:embed="rId5">
+                <a:extLst>
+                  <a:ext uri="{28A0092B-C50C-407E-A947-70E740481C1C}">
+                    <a14:useLocalDpi xmlns:a14="http://schemas.microsoft.com/office/drawing/2010/main" val="0"/>
+                  </a:ext>
+                </a:extLst>
+              </a:blip>
+              <a:stretch>
+                <a:fillRect/>
+              </a:stretch>
+            </p:blipFill>
+            <p:spPr>
+              <a:xfrm>
+                <a:off x="4419434" y="1691924"/>
+                <a:ext cx="565900" cy="565900"/>
+              </a:xfrm>
+              <a:prstGeom prst="rect">
+                <a:avLst/>
+              </a:prstGeom>
+            </p:spPr>
+          </p:pic>
+          <p:sp>
+            <p:nvSpPr>
+              <p:cNvPr id="32" name="TextBox 31"/>
+              <p:cNvSpPr txBox="1"/>
+              <p:nvPr/>
+            </p:nvSpPr>
+            <p:spPr>
+              <a:xfrm>
+                <a:off x="4073031" y="2199459"/>
+                <a:ext cx="1279006" cy="523220"/>
+              </a:xfrm>
+              <a:prstGeom prst="rect">
+                <a:avLst/>
+              </a:prstGeom>
+              <a:noFill/>
+            </p:spPr>
+            <p:txBody>
+              <a:bodyPr wrap="square" rtlCol="0">
+                <a:spAutoFit/>
+              </a:bodyPr>
+              <a:lstStyle/>
+              <a:p>
+                <a:pPr algn="ctr"/>
+                <a:r>
+                  <a:rPr lang="en-US" sz="1400" dirty="0">
+                    <a:solidFill>
+                      <a:schemeClr val="tx1">
+                        <a:lumMod val="65000"/>
+                        <a:lumOff val="35000"/>
+                      </a:schemeClr>
+                    </a:solidFill>
+                  </a:rPr>
+                  <a:t>Internal Load Balancer</a:t>
+                </a:r>
+              </a:p>
+            </p:txBody>
+          </p:sp>
+        </p:grpSp>
+        <p:grpSp>
+          <p:nvGrpSpPr>
+            <p:cNvPr id="62" name="Group 61"/>
+            <p:cNvGrpSpPr/>
+            <p:nvPr/>
+          </p:nvGrpSpPr>
+          <p:grpSpPr>
+            <a:xfrm>
+              <a:off x="6869079" y="2626652"/>
+              <a:ext cx="1039249" cy="1030755"/>
+              <a:chOff x="3976888" y="4348907"/>
+              <a:chExt cx="1039249" cy="1030755"/>
+            </a:xfrm>
+          </p:grpSpPr>
+          <p:pic>
+            <p:nvPicPr>
+              <p:cNvPr id="60" name="Picture 59"/>
+              <p:cNvPicPr>
+                <a:picLocks noChangeAspect="1"/>
+              </p:cNvPicPr>
+              <p:nvPr/>
+            </p:nvPicPr>
+            <p:blipFill>
+              <a:blip r:embed="rId5">
+                <a:extLst>
+                  <a:ext uri="{28A0092B-C50C-407E-A947-70E740481C1C}">
+                    <a14:useLocalDpi xmlns:a14="http://schemas.microsoft.com/office/drawing/2010/main" val="0"/>
+                  </a:ext>
+                </a:extLst>
+              </a:blip>
+              <a:stretch>
+                <a:fillRect/>
+              </a:stretch>
+            </p:blipFill>
+            <p:spPr>
+              <a:xfrm>
+                <a:off x="4213563" y="4348907"/>
+                <a:ext cx="565900" cy="565900"/>
+              </a:xfrm>
+              <a:prstGeom prst="rect">
+                <a:avLst/>
+              </a:prstGeom>
+            </p:spPr>
+          </p:pic>
+          <p:sp>
+            <p:nvSpPr>
+              <p:cNvPr id="61" name="TextBox 60"/>
+              <p:cNvSpPr txBox="1"/>
+              <p:nvPr/>
+            </p:nvSpPr>
+            <p:spPr>
+              <a:xfrm>
+                <a:off x="3976888" y="4856442"/>
+                <a:ext cx="1039249" cy="523220"/>
+              </a:xfrm>
+              <a:prstGeom prst="rect">
+                <a:avLst/>
+              </a:prstGeom>
+              <a:noFill/>
+            </p:spPr>
+            <p:txBody>
+              <a:bodyPr wrap="square" rtlCol="0">
+                <a:spAutoFit/>
+              </a:bodyPr>
+              <a:lstStyle/>
+              <a:p>
+                <a:pPr algn="ctr"/>
+                <a:r>
+                  <a:rPr lang="en-US" sz="1400" dirty="0">
+                    <a:solidFill>
+                      <a:schemeClr val="tx1">
+                        <a:lumMod val="65000"/>
+                        <a:lumOff val="35000"/>
+                      </a:schemeClr>
+                    </a:solidFill>
+                  </a:rPr>
+                  <a:t>Public Load Balancer</a:t>
+                </a:r>
+              </a:p>
+            </p:txBody>
+          </p:sp>
+        </p:grpSp>
+        <p:grpSp>
+          <p:nvGrpSpPr>
+            <p:cNvPr id="93" name="Group 92"/>
+            <p:cNvGrpSpPr/>
+            <p:nvPr/>
+          </p:nvGrpSpPr>
+          <p:grpSpPr>
+            <a:xfrm>
+              <a:off x="7851518" y="3674013"/>
+              <a:ext cx="1616473" cy="1326762"/>
+              <a:chOff x="4150783" y="2977678"/>
+              <a:chExt cx="1616473" cy="1326762"/>
+            </a:xfrm>
+          </p:grpSpPr>
+          <p:pic>
+            <p:nvPicPr>
+              <p:cNvPr id="64" name="Picture 63"/>
+              <p:cNvPicPr>
+                <a:picLocks noChangeAspect="1"/>
+              </p:cNvPicPr>
+              <p:nvPr/>
+            </p:nvPicPr>
+            <p:blipFill>
+              <a:blip r:embed="rId6">
+                <a:extLst>
+                  <a:ext uri="{28A0092B-C50C-407E-A947-70E740481C1C}">
+                    <a14:useLocalDpi xmlns:a14="http://schemas.microsoft.com/office/drawing/2010/main" val="0"/>
+                  </a:ext>
+                </a:extLst>
+              </a:blip>
+              <a:stretch>
+                <a:fillRect/>
+              </a:stretch>
+            </p:blipFill>
+            <p:spPr>
+              <a:xfrm>
+                <a:off x="4548977" y="3496535"/>
+                <a:ext cx="569612" cy="569612"/>
+              </a:xfrm>
+              <a:prstGeom prst="rect">
+                <a:avLst/>
+              </a:prstGeom>
+            </p:spPr>
+          </p:pic>
+          <p:sp>
+            <p:nvSpPr>
+              <p:cNvPr id="88" name="TextBox 87"/>
+              <p:cNvSpPr txBox="1"/>
+              <p:nvPr/>
+            </p:nvSpPr>
+            <p:spPr>
+              <a:xfrm>
+                <a:off x="4150783" y="3996663"/>
+                <a:ext cx="1368481" cy="307777"/>
+              </a:xfrm>
+              <a:prstGeom prst="rect">
+                <a:avLst/>
+              </a:prstGeom>
+              <a:noFill/>
+            </p:spPr>
+            <p:txBody>
+              <a:bodyPr wrap="square" rtlCol="0">
+                <a:spAutoFit/>
+              </a:bodyPr>
+              <a:lstStyle/>
+              <a:p>
+                <a:pPr algn="ctr"/>
+                <a:r>
+                  <a:rPr lang="en-US" sz="1400" dirty="0" err="1">
+                    <a:solidFill>
+                      <a:schemeClr val="tx1">
+                        <a:lumMod val="65000"/>
+                        <a:lumOff val="35000"/>
+                      </a:schemeClr>
+                    </a:solidFill>
+                  </a:rPr>
+                  <a:t>Jumpbox</a:t>
+                </a:r>
+                <a:endParaRPr lang="en-US" sz="1400" dirty="0">
+                  <a:solidFill>
+                    <a:schemeClr val="tx1">
+                      <a:lumMod val="65000"/>
+                      <a:lumOff val="35000"/>
+                    </a:schemeClr>
+                  </a:solidFill>
+                </a:endParaRPr>
+              </a:p>
+            </p:txBody>
+          </p:sp>
+          <p:pic>
+            <p:nvPicPr>
+              <p:cNvPr id="89" name="Picture 88"/>
+              <p:cNvPicPr>
+                <a:picLocks noChangeAspect="1"/>
+              </p:cNvPicPr>
+              <p:nvPr/>
+            </p:nvPicPr>
+            <p:blipFill>
+              <a:blip r:embed="rId3">
+                <a:extLst>
+                  <a:ext uri="{BEBA8EAE-BF5A-486C-A8C5-ECC9F3942E4B}">
+                    <a14:imgProps xmlns:a14="http://schemas.microsoft.com/office/drawing/2010/main">
+                      <a14:imgLayer r:embed="rId4">
+                        <a14:imgEffect>
+                          <a14:saturation sat="0"/>
+                        </a14:imgEffect>
+                      </a14:imgLayer>
+                    </a14:imgProps>
+                  </a:ext>
+                  <a:ext uri="{28A0092B-C50C-407E-A947-70E740481C1C}">
+                    <a14:useLocalDpi xmlns:a14="http://schemas.microsoft.com/office/drawing/2010/main" val="0"/>
+                  </a:ext>
+                </a:extLst>
+              </a:blip>
+              <a:stretch>
+                <a:fillRect/>
+              </a:stretch>
+            </p:blipFill>
+            <p:spPr>
+              <a:xfrm>
+                <a:off x="5335693" y="3064027"/>
+                <a:ext cx="366736" cy="366736"/>
+              </a:xfrm>
+              <a:prstGeom prst="rect">
+                <a:avLst/>
+              </a:prstGeom>
+            </p:spPr>
+          </p:pic>
+          <p:sp>
+            <p:nvSpPr>
+              <p:cNvPr id="90" name="Rectangle 89"/>
+              <p:cNvSpPr/>
+              <p:nvPr/>
+            </p:nvSpPr>
+            <p:spPr>
+              <a:xfrm>
+                <a:off x="4183168" y="3026709"/>
+                <a:ext cx="1519261" cy="1277731"/>
+              </a:xfrm>
+              <a:prstGeom prst="rect">
+                <a:avLst/>
+              </a:prstGeom>
+              <a:noFill/>
+              <a:ln>
+                <a:prstDash val="dash"/>
+              </a:ln>
+            </p:spPr>
+            <p:style>
+              <a:lnRef idx="2">
+                <a:schemeClr val="accent1">
+                  <a:shade val="50000"/>
+                </a:schemeClr>
+              </a:lnRef>
+              <a:fillRef idx="1">
+                <a:schemeClr val="accent1"/>
+              </a:fillRef>
+              <a:effectRef idx="0">
+                <a:schemeClr val="accent1"/>
+              </a:effectRef>
+              <a:fontRef idx="minor">
+                <a:schemeClr val="lt1"/>
+              </a:fontRef>
+            </p:style>
+            <p:txBody>
+              <a:bodyPr rtlCol="0" anchor="ctr"/>
+              <a:lstStyle/>
+              <a:p>
+                <a:pPr algn="ctr"/>
+                <a:endParaRPr lang="en-US"/>
+              </a:p>
+            </p:txBody>
+          </p:sp>
+          <p:sp>
+            <p:nvSpPr>
+              <p:cNvPr id="91" name="TextBox 90"/>
+              <p:cNvSpPr txBox="1"/>
+              <p:nvPr/>
+            </p:nvSpPr>
+            <p:spPr>
+              <a:xfrm>
+                <a:off x="4196919" y="2977678"/>
+                <a:ext cx="1531619" cy="307777"/>
+              </a:xfrm>
+              <a:prstGeom prst="rect">
+                <a:avLst/>
+              </a:prstGeom>
+              <a:noFill/>
+            </p:spPr>
+            <p:txBody>
+              <a:bodyPr wrap="square" rtlCol="0">
+                <a:spAutoFit/>
+              </a:bodyPr>
+              <a:lstStyle/>
+              <a:p>
+                <a:r>
+                  <a:rPr lang="en-US" sz="1400" dirty="0" err="1">
+                    <a:solidFill>
+                      <a:schemeClr val="tx1">
+                        <a:lumMod val="65000"/>
+                        <a:lumOff val="35000"/>
+                      </a:schemeClr>
+                    </a:solidFill>
+                  </a:rPr>
+                  <a:t>Mgmt</a:t>
+                </a:r>
+                <a:r>
+                  <a:rPr lang="en-US" sz="1400" dirty="0">
+                    <a:solidFill>
+                      <a:schemeClr val="tx1">
+                        <a:lumMod val="65000"/>
+                        <a:lumOff val="35000"/>
+                      </a:schemeClr>
+                    </a:solidFill>
+                  </a:rPr>
+                  <a:t> Subnet</a:t>
+                </a:r>
+              </a:p>
+            </p:txBody>
+          </p:sp>
+          <p:sp>
+            <p:nvSpPr>
+              <p:cNvPr id="92" name="TextBox 91"/>
+              <p:cNvSpPr txBox="1"/>
+              <p:nvPr/>
+            </p:nvSpPr>
+            <p:spPr>
+              <a:xfrm>
+                <a:off x="5270866" y="3383268"/>
+                <a:ext cx="496390" cy="307777"/>
+              </a:xfrm>
+              <a:prstGeom prst="rect">
+                <a:avLst/>
+              </a:prstGeom>
+              <a:noFill/>
+            </p:spPr>
+            <p:txBody>
+              <a:bodyPr wrap="square" rtlCol="0">
+                <a:spAutoFit/>
+              </a:bodyPr>
+              <a:lstStyle/>
+              <a:p>
+                <a:pPr algn="ctr"/>
+                <a:r>
+                  <a:rPr lang="en-US" sz="1400" dirty="0">
+                    <a:solidFill>
+                      <a:schemeClr val="tx1">
+                        <a:lumMod val="65000"/>
+                        <a:lumOff val="35000"/>
+                      </a:schemeClr>
+                    </a:solidFill>
+                  </a:rPr>
+                  <a:t>NSG</a:t>
+                </a:r>
+              </a:p>
+            </p:txBody>
+          </p:sp>
+        </p:grpSp>
+        <p:grpSp>
+          <p:nvGrpSpPr>
+            <p:cNvPr id="105" name="Group 104"/>
+            <p:cNvGrpSpPr/>
+            <p:nvPr/>
+          </p:nvGrpSpPr>
+          <p:grpSpPr>
+            <a:xfrm>
+              <a:off x="10795701" y="5118910"/>
+              <a:ext cx="1344799" cy="1026504"/>
+              <a:chOff x="3201075" y="3395797"/>
+              <a:chExt cx="1344799" cy="1026504"/>
+            </a:xfrm>
+          </p:grpSpPr>
+          <p:pic>
+            <p:nvPicPr>
+              <p:cNvPr id="96" name="Picture 95"/>
+              <p:cNvPicPr>
+                <a:picLocks noChangeAspect="1"/>
+              </p:cNvPicPr>
+              <p:nvPr/>
+            </p:nvPicPr>
+            <p:blipFill>
+              <a:blip r:embed="rId7">
+                <a:extLst>
+                  <a:ext uri="{28A0092B-C50C-407E-A947-70E740481C1C}">
+                    <a14:useLocalDpi xmlns:a14="http://schemas.microsoft.com/office/drawing/2010/main" val="0"/>
+                  </a:ext>
+                </a:extLst>
+              </a:blip>
+              <a:stretch>
+                <a:fillRect/>
+              </a:stretch>
+            </p:blipFill>
+            <p:spPr>
+              <a:xfrm>
+                <a:off x="3588668" y="3395797"/>
+                <a:ext cx="569612" cy="569612"/>
+              </a:xfrm>
+              <a:prstGeom prst="rect">
+                <a:avLst/>
+              </a:prstGeom>
+            </p:spPr>
+          </p:pic>
+          <p:sp>
+            <p:nvSpPr>
+              <p:cNvPr id="97" name="TextBox 96"/>
+              <p:cNvSpPr txBox="1"/>
+              <p:nvPr/>
+            </p:nvSpPr>
+            <p:spPr>
+              <a:xfrm>
+                <a:off x="3201075" y="3899081"/>
+                <a:ext cx="1344799" cy="523220"/>
+              </a:xfrm>
+              <a:prstGeom prst="rect">
+                <a:avLst/>
+              </a:prstGeom>
+              <a:noFill/>
+            </p:spPr>
+            <p:txBody>
+              <a:bodyPr wrap="square" rtlCol="0">
+                <a:spAutoFit/>
+              </a:bodyPr>
+              <a:lstStyle/>
+              <a:p>
+                <a:pPr algn="ctr"/>
+                <a:r>
+                  <a:rPr lang="en-US" sz="1400" dirty="0">
+                    <a:solidFill>
+                      <a:schemeClr val="tx1">
+                        <a:lumMod val="65000"/>
+                        <a:lumOff val="35000"/>
+                      </a:schemeClr>
+                    </a:solidFill>
+                  </a:rPr>
+                  <a:t>Document DB</a:t>
+                </a:r>
+              </a:p>
+              <a:p>
+                <a:pPr algn="ctr"/>
+                <a:r>
+                  <a:rPr lang="en-US" sz="1400" dirty="0">
+                    <a:solidFill>
+                      <a:schemeClr val="tx1">
+                        <a:lumMod val="65000"/>
+                        <a:lumOff val="35000"/>
+                      </a:schemeClr>
+                    </a:solidFill>
+                  </a:rPr>
+                  <a:t>(Mongo DB API)</a:t>
+                </a:r>
+              </a:p>
+            </p:txBody>
+          </p:sp>
+        </p:grpSp>
+        <p:grpSp>
+          <p:nvGrpSpPr>
+            <p:cNvPr id="106" name="Group 105"/>
+            <p:cNvGrpSpPr/>
+            <p:nvPr/>
+          </p:nvGrpSpPr>
+          <p:grpSpPr>
+            <a:xfrm>
+              <a:off x="9363001" y="5118910"/>
+              <a:ext cx="1344799" cy="811061"/>
+              <a:chOff x="4726134" y="3395797"/>
+              <a:chExt cx="1344799" cy="811061"/>
+            </a:xfrm>
+          </p:grpSpPr>
+          <p:pic>
+            <p:nvPicPr>
+              <p:cNvPr id="98" name="Picture 97"/>
+              <p:cNvPicPr>
+                <a:picLocks noChangeAspect="1"/>
+              </p:cNvPicPr>
+              <p:nvPr/>
+            </p:nvPicPr>
+            <p:blipFill>
+              <a:blip r:embed="rId8">
+                <a:extLst>
+                  <a:ext uri="{28A0092B-C50C-407E-A947-70E740481C1C}">
+                    <a14:useLocalDpi xmlns:a14="http://schemas.microsoft.com/office/drawing/2010/main" val="0"/>
+                  </a:ext>
+                </a:extLst>
+              </a:blip>
+              <a:stretch>
+                <a:fillRect/>
+              </a:stretch>
+            </p:blipFill>
+            <p:spPr>
+              <a:xfrm>
+                <a:off x="5128787" y="3395797"/>
+                <a:ext cx="569612" cy="569612"/>
+              </a:xfrm>
+              <a:prstGeom prst="rect">
+                <a:avLst/>
+              </a:prstGeom>
+            </p:spPr>
+          </p:pic>
+          <p:sp>
+            <p:nvSpPr>
+              <p:cNvPr id="101" name="TextBox 100"/>
+              <p:cNvSpPr txBox="1"/>
+              <p:nvPr/>
+            </p:nvSpPr>
+            <p:spPr>
+              <a:xfrm>
+                <a:off x="4726134" y="3899081"/>
+                <a:ext cx="1344799" cy="307777"/>
+              </a:xfrm>
+              <a:prstGeom prst="rect">
+                <a:avLst/>
+              </a:prstGeom>
+              <a:noFill/>
+            </p:spPr>
+            <p:txBody>
+              <a:bodyPr wrap="square" rtlCol="0">
+                <a:spAutoFit/>
+              </a:bodyPr>
+              <a:lstStyle/>
+              <a:p>
+                <a:pPr algn="ctr"/>
+                <a:r>
+                  <a:rPr lang="en-US" sz="1400" dirty="0" err="1">
+                    <a:solidFill>
+                      <a:schemeClr val="tx1">
+                        <a:lumMod val="65000"/>
+                        <a:lumOff val="35000"/>
+                      </a:schemeClr>
+                    </a:solidFill>
+                  </a:rPr>
+                  <a:t>Redis</a:t>
+                </a:r>
+                <a:r>
+                  <a:rPr lang="en-US" sz="1400" dirty="0">
+                    <a:solidFill>
+                      <a:schemeClr val="tx1">
+                        <a:lumMod val="65000"/>
+                        <a:lumOff val="35000"/>
+                      </a:schemeClr>
+                    </a:solidFill>
+                  </a:rPr>
+                  <a:t> Cache</a:t>
+                </a:r>
+              </a:p>
+            </p:txBody>
+          </p:sp>
+        </p:grpSp>
+        <p:grpSp>
+          <p:nvGrpSpPr>
+            <p:cNvPr id="104" name="Group 103"/>
+            <p:cNvGrpSpPr/>
+            <p:nvPr/>
+          </p:nvGrpSpPr>
+          <p:grpSpPr>
+            <a:xfrm>
+              <a:off x="8185532" y="5108672"/>
+              <a:ext cx="1082556" cy="1026504"/>
+              <a:chOff x="1450913" y="3395797"/>
+              <a:chExt cx="1082556" cy="1026504"/>
+            </a:xfrm>
+          </p:grpSpPr>
+          <p:pic>
+            <p:nvPicPr>
+              <p:cNvPr id="99" name="Picture 98"/>
+              <p:cNvPicPr>
+                <a:picLocks noChangeAspect="1"/>
+              </p:cNvPicPr>
+              <p:nvPr/>
+            </p:nvPicPr>
+            <p:blipFill>
+              <a:blip r:embed="rId9">
+                <a:extLst>
+                  <a:ext uri="{28A0092B-C50C-407E-A947-70E740481C1C}">
+                    <a14:useLocalDpi xmlns:a14="http://schemas.microsoft.com/office/drawing/2010/main" val="0"/>
+                  </a:ext>
+                </a:extLst>
+              </a:blip>
+              <a:stretch>
+                <a:fillRect/>
+              </a:stretch>
+            </p:blipFill>
+            <p:spPr>
+              <a:xfrm>
+                <a:off x="1707385" y="3395797"/>
+                <a:ext cx="569612" cy="569612"/>
+              </a:xfrm>
+              <a:prstGeom prst="rect">
+                <a:avLst/>
+              </a:prstGeom>
+            </p:spPr>
+          </p:pic>
+          <p:sp>
+            <p:nvSpPr>
+              <p:cNvPr id="102" name="TextBox 101"/>
+              <p:cNvSpPr txBox="1"/>
+              <p:nvPr/>
+            </p:nvSpPr>
+            <p:spPr>
+              <a:xfrm>
+                <a:off x="1450913" y="3899081"/>
+                <a:ext cx="1082556" cy="523220"/>
+              </a:xfrm>
+              <a:prstGeom prst="rect">
+                <a:avLst/>
+              </a:prstGeom>
+              <a:noFill/>
+            </p:spPr>
+            <p:txBody>
+              <a:bodyPr wrap="square" rtlCol="0">
+                <a:spAutoFit/>
+              </a:bodyPr>
+              <a:lstStyle/>
+              <a:p>
+                <a:pPr algn="ctr"/>
+                <a:r>
+                  <a:rPr lang="en-US" sz="1400" dirty="0">
+                    <a:solidFill>
+                      <a:schemeClr val="tx1">
+                        <a:lumMod val="65000"/>
+                        <a:lumOff val="35000"/>
+                      </a:schemeClr>
+                    </a:solidFill>
+                  </a:rPr>
+                  <a:t>Application Insights</a:t>
+                </a:r>
+              </a:p>
+            </p:txBody>
+          </p:sp>
+        </p:grpSp>
+      </p:grpSp>
+      <p:grpSp>
+        <p:nvGrpSpPr>
+          <p:cNvPr id="159" name="Group 158"/>
+          <p:cNvGrpSpPr/>
+          <p:nvPr/>
+        </p:nvGrpSpPr>
+        <p:grpSpPr>
+          <a:xfrm>
+            <a:off x="5636611" y="1816005"/>
+            <a:ext cx="934691" cy="1043044"/>
+            <a:chOff x="5629855" y="1816807"/>
+            <a:chExt cx="934691" cy="1043044"/>
+          </a:xfrm>
+        </p:grpSpPr>
+        <p:pic>
+          <p:nvPicPr>
+            <p:cNvPr id="94" name="Picture 93"/>
+            <p:cNvPicPr>
+              <a:picLocks noChangeAspect="1"/>
+            </p:cNvPicPr>
+            <p:nvPr/>
+          </p:nvPicPr>
+          <p:blipFill>
+            <a:blip r:embed="rId10">
+              <a:extLst>
+                <a:ext uri="{28A0092B-C50C-407E-A947-70E740481C1C}">
+                  <a14:useLocalDpi xmlns:a14="http://schemas.microsoft.com/office/drawing/2010/main" val="0"/>
+                </a:ext>
+              </a:extLst>
+            </a:blip>
+            <a:stretch>
+              <a:fillRect/>
+            </a:stretch>
+          </p:blipFill>
+          <p:spPr>
+            <a:xfrm>
+              <a:off x="5812997" y="1816807"/>
+              <a:ext cx="569612" cy="569612"/>
+            </a:xfrm>
+            <a:prstGeom prst="rect">
+              <a:avLst/>
+            </a:prstGeom>
+          </p:spPr>
+        </p:pic>
+        <p:sp>
+          <p:nvSpPr>
+            <p:cNvPr id="103" name="TextBox 102"/>
+            <p:cNvSpPr txBox="1"/>
+            <p:nvPr/>
+          </p:nvSpPr>
+          <p:spPr>
+            <a:xfrm>
+              <a:off x="5629855" y="2336631"/>
+              <a:ext cx="934691" cy="523220"/>
+            </a:xfrm>
+            <a:prstGeom prst="rect">
+              <a:avLst/>
+            </a:prstGeom>
+            <a:noFill/>
+          </p:spPr>
+          <p:txBody>
+            <a:bodyPr wrap="square" rtlCol="0">
+              <a:spAutoFit/>
+            </a:bodyPr>
+            <a:lstStyle/>
+            <a:p>
+              <a:pPr algn="ctr"/>
+              <a:r>
+                <a:rPr lang="en-US" sz="1400" dirty="0">
+                  <a:solidFill>
+                    <a:schemeClr val="tx1">
+                      <a:lumMod val="65000"/>
+                      <a:lumOff val="35000"/>
+                    </a:schemeClr>
+                  </a:solidFill>
+                </a:rPr>
+                <a:t>Traffic Manager</a:t>
+              </a:r>
+            </a:p>
+          </p:txBody>
+        </p:sp>
+      </p:grpSp>
+      <p:grpSp>
+        <p:nvGrpSpPr>
+          <p:cNvPr id="171" name="Group 170"/>
+          <p:cNvGrpSpPr/>
+          <p:nvPr/>
+        </p:nvGrpSpPr>
+        <p:grpSpPr>
+          <a:xfrm>
+            <a:off x="5699580" y="624574"/>
+            <a:ext cx="792839" cy="692625"/>
+            <a:chOff x="5699580" y="968279"/>
+            <a:chExt cx="792839" cy="692625"/>
+          </a:xfrm>
+        </p:grpSpPr>
+        <p:pic>
+          <p:nvPicPr>
+            <p:cNvPr id="109" name="Picture 108"/>
+            <p:cNvPicPr>
+              <a:picLocks noChangeAspect="1"/>
+            </p:cNvPicPr>
+            <p:nvPr/>
+          </p:nvPicPr>
+          <p:blipFill>
+            <a:blip r:embed="rId11">
+              <a:extLst>
+                <a:ext uri="{28A0092B-C50C-407E-A947-70E740481C1C}">
+                  <a14:useLocalDpi xmlns:a14="http://schemas.microsoft.com/office/drawing/2010/main" val="0"/>
+                </a:ext>
+              </a:extLst>
+            </a:blip>
+            <a:stretch>
+              <a:fillRect/>
+            </a:stretch>
+          </p:blipFill>
+          <p:spPr>
+            <a:xfrm>
+              <a:off x="5817198" y="1091292"/>
+              <a:ext cx="569612" cy="569612"/>
+            </a:xfrm>
+            <a:prstGeom prst="rect">
+              <a:avLst/>
+            </a:prstGeom>
+          </p:spPr>
+        </p:pic>
+        <p:sp>
+          <p:nvSpPr>
+            <p:cNvPr id="110" name="TextBox 109"/>
+            <p:cNvSpPr txBox="1"/>
+            <p:nvPr/>
+          </p:nvSpPr>
+          <p:spPr>
+            <a:xfrm>
+              <a:off x="5699580" y="968279"/>
+              <a:ext cx="792839" cy="307777"/>
+            </a:xfrm>
+            <a:prstGeom prst="rect">
+              <a:avLst/>
+            </a:prstGeom>
+            <a:noFill/>
+          </p:spPr>
+          <p:txBody>
+            <a:bodyPr wrap="square" rtlCol="0">
+              <a:spAutoFit/>
+            </a:bodyPr>
+            <a:lstStyle/>
+            <a:p>
+              <a:pPr algn="ctr"/>
+              <a:r>
+                <a:rPr lang="en-US" sz="1400" dirty="0">
+                  <a:solidFill>
+                    <a:schemeClr val="tx1">
+                      <a:lumMod val="65000"/>
+                      <a:lumOff val="35000"/>
+                    </a:schemeClr>
+                  </a:solidFill>
+                </a:rPr>
+                <a:t>Internet</a:t>
+              </a:r>
+            </a:p>
+          </p:txBody>
+        </p:sp>
+      </p:grpSp>
+      <p:grpSp>
+        <p:nvGrpSpPr>
+          <p:cNvPr id="161" name="Group 160"/>
+          <p:cNvGrpSpPr/>
+          <p:nvPr/>
+        </p:nvGrpSpPr>
+        <p:grpSpPr>
+          <a:xfrm>
+            <a:off x="88313" y="1451362"/>
+            <a:ext cx="5321029" cy="4694052"/>
+            <a:chOff x="67413" y="1451362"/>
+            <a:chExt cx="5321029" cy="4694052"/>
+          </a:xfrm>
+        </p:grpSpPr>
+        <p:sp>
+          <p:nvSpPr>
+            <p:cNvPr id="116" name="Rectangle 115"/>
+            <p:cNvSpPr/>
+            <p:nvPr/>
+          </p:nvSpPr>
+          <p:spPr>
+            <a:xfrm>
+              <a:off x="67413" y="1470908"/>
+              <a:ext cx="5321029" cy="4636068"/>
+            </a:xfrm>
+            <a:prstGeom prst="rect">
+              <a:avLst/>
+            </a:prstGeom>
+            <a:solidFill>
+              <a:schemeClr val="accent3">
+                <a:alpha val="21000"/>
+              </a:schemeClr>
+            </a:solidFill>
+            <a:ln w="19050">
+              <a:solidFill>
+                <a:schemeClr val="tx1">
+                  <a:lumMod val="65000"/>
+                  <a:lumOff val="35000"/>
+                </a:schemeClr>
+              </a:solidFill>
+              <a:prstDash val="solid"/>
+            </a:ln>
+          </p:spPr>
+          <p:style>
+            <a:lnRef idx="2">
+              <a:schemeClr val="accent1">
+                <a:shade val="50000"/>
+              </a:schemeClr>
+            </a:lnRef>
+            <a:fillRef idx="1">
+              <a:schemeClr val="accent1"/>
+            </a:fillRef>
+            <a:effectRef idx="0">
+              <a:schemeClr val="accent1"/>
+            </a:effectRef>
+            <a:fontRef idx="minor">
+              <a:schemeClr val="lt1"/>
+            </a:fontRef>
+          </p:style>
+          <p:txBody>
+            <a:bodyPr rtlCol="0" anchor="ctr"/>
+            <a:lstStyle/>
+            <a:p>
+              <a:pPr algn="ctr"/>
+              <a:endParaRPr lang="en-US"/>
+            </a:p>
+          </p:txBody>
+        </p:sp>
+        <p:sp>
+          <p:nvSpPr>
+            <p:cNvPr id="117" name="Rectangle 116"/>
+            <p:cNvSpPr/>
+            <p:nvPr/>
+          </p:nvSpPr>
+          <p:spPr>
+            <a:xfrm>
+              <a:off x="141610" y="1838876"/>
+              <a:ext cx="5194569" cy="3232478"/>
+            </a:xfrm>
+            <a:prstGeom prst="rect">
+              <a:avLst/>
+            </a:prstGeom>
+            <a:solidFill>
+              <a:schemeClr val="accent1">
+                <a:alpha val="21000"/>
+              </a:schemeClr>
+            </a:solidFill>
+            <a:ln w="19050">
+              <a:prstDash val="dash"/>
+            </a:ln>
+          </p:spPr>
+          <p:style>
+            <a:lnRef idx="2">
+              <a:schemeClr val="accent1">
+                <a:shade val="50000"/>
+              </a:schemeClr>
+            </a:lnRef>
+            <a:fillRef idx="1">
+              <a:schemeClr val="accent1"/>
+            </a:fillRef>
+            <a:effectRef idx="0">
+              <a:schemeClr val="accent1"/>
+            </a:effectRef>
+            <a:fontRef idx="minor">
+              <a:schemeClr val="lt1"/>
+            </a:fontRef>
+          </p:style>
+          <p:txBody>
+            <a:bodyPr rtlCol="0" anchor="ctr"/>
+            <a:lstStyle/>
+            <a:p>
+              <a:pPr algn="ctr"/>
+              <a:endParaRPr lang="en-US"/>
+            </a:p>
+          </p:txBody>
+        </p:sp>
+        <p:sp>
+          <p:nvSpPr>
+            <p:cNvPr id="118" name="TextBox 117"/>
+            <p:cNvSpPr txBox="1"/>
+            <p:nvPr/>
+          </p:nvSpPr>
+          <p:spPr>
+            <a:xfrm>
+              <a:off x="141610" y="1800438"/>
+              <a:ext cx="1410223" cy="307777"/>
+            </a:xfrm>
+            <a:prstGeom prst="rect">
+              <a:avLst/>
+            </a:prstGeom>
+            <a:noFill/>
+          </p:spPr>
+          <p:txBody>
+            <a:bodyPr wrap="square" rtlCol="0">
+              <a:spAutoFit/>
+            </a:bodyPr>
+            <a:lstStyle/>
+            <a:p>
+              <a:r>
+                <a:rPr lang="en-US" sz="1400" dirty="0">
+                  <a:solidFill>
+                    <a:schemeClr val="tx1">
+                      <a:lumMod val="65000"/>
+                      <a:lumOff val="35000"/>
+                    </a:schemeClr>
+                  </a:solidFill>
+                </a:rPr>
+                <a:t>Virtual Network</a:t>
+              </a:r>
+            </a:p>
+          </p:txBody>
+        </p:sp>
+        <p:sp>
+          <p:nvSpPr>
+            <p:cNvPr id="119" name="TextBox 118"/>
+            <p:cNvSpPr txBox="1"/>
+            <p:nvPr/>
+          </p:nvSpPr>
+          <p:spPr>
+            <a:xfrm>
+              <a:off x="67413" y="1451362"/>
+              <a:ext cx="1806783" cy="307777"/>
+            </a:xfrm>
+            <a:prstGeom prst="rect">
+              <a:avLst/>
+            </a:prstGeom>
+            <a:noFill/>
+          </p:spPr>
+          <p:txBody>
+            <a:bodyPr wrap="square" rtlCol="0">
+              <a:spAutoFit/>
+            </a:bodyPr>
+            <a:lstStyle/>
+            <a:p>
+              <a:r>
+                <a:rPr lang="en-US" sz="1400" dirty="0">
+                  <a:solidFill>
+                    <a:schemeClr val="tx1">
+                      <a:lumMod val="65000"/>
+                      <a:lumOff val="35000"/>
+                    </a:schemeClr>
+                  </a:solidFill>
+                </a:rPr>
+                <a:t>West US Data Center</a:t>
+              </a:r>
+            </a:p>
+          </p:txBody>
+        </p:sp>
+        <p:grpSp>
+          <p:nvGrpSpPr>
+            <p:cNvPr id="120" name="Group 119"/>
+            <p:cNvGrpSpPr/>
+            <p:nvPr/>
+          </p:nvGrpSpPr>
+          <p:grpSpPr>
+            <a:xfrm>
+              <a:off x="2785582" y="2117988"/>
+              <a:ext cx="1616473" cy="1542765"/>
+              <a:chOff x="1146440" y="1203571"/>
+              <a:chExt cx="1616473" cy="1542765"/>
+            </a:xfrm>
+          </p:grpSpPr>
+          <p:pic>
+            <p:nvPicPr>
+              <p:cNvPr id="149" name="Picture 148"/>
+              <p:cNvPicPr>
+                <a:picLocks noChangeAspect="1"/>
+              </p:cNvPicPr>
+              <p:nvPr/>
+            </p:nvPicPr>
+            <p:blipFill>
+              <a:blip r:embed="rId2">
+                <a:extLst>
+                  <a:ext uri="{28A0092B-C50C-407E-A947-70E740481C1C}">
+                    <a14:useLocalDpi xmlns:a14="http://schemas.microsoft.com/office/drawing/2010/main" val="0"/>
+                  </a:ext>
+                </a:extLst>
+              </a:blip>
+              <a:stretch>
+                <a:fillRect/>
+              </a:stretch>
+            </p:blipFill>
+            <p:spPr>
+              <a:xfrm>
+                <a:off x="1501138" y="1711379"/>
+                <a:ext cx="569612" cy="569612"/>
+              </a:xfrm>
+              <a:prstGeom prst="rect">
+                <a:avLst/>
+              </a:prstGeom>
+            </p:spPr>
+          </p:pic>
+          <p:sp>
+            <p:nvSpPr>
+              <p:cNvPr id="150" name="TextBox 149"/>
+              <p:cNvSpPr txBox="1"/>
+              <p:nvPr/>
+            </p:nvSpPr>
+            <p:spPr>
+              <a:xfrm>
+                <a:off x="1146440" y="2222556"/>
+                <a:ext cx="1368481" cy="523220"/>
+              </a:xfrm>
+              <a:prstGeom prst="rect">
+                <a:avLst/>
+              </a:prstGeom>
+              <a:noFill/>
+            </p:spPr>
+            <p:txBody>
+              <a:bodyPr wrap="square" rtlCol="0">
+                <a:spAutoFit/>
+              </a:bodyPr>
+              <a:lstStyle/>
+              <a:p>
+                <a:pPr algn="ctr"/>
+                <a:r>
+                  <a:rPr lang="en-US" sz="1400" dirty="0">
+                    <a:solidFill>
+                      <a:schemeClr val="tx1">
+                        <a:lumMod val="65000"/>
+                        <a:lumOff val="35000"/>
+                      </a:schemeClr>
+                    </a:solidFill>
+                  </a:rPr>
+                  <a:t>Virtual Machine Scale Set</a:t>
+                </a:r>
+              </a:p>
+            </p:txBody>
+          </p:sp>
+          <p:pic>
+            <p:nvPicPr>
+              <p:cNvPr id="151" name="Picture 150"/>
+              <p:cNvPicPr>
+                <a:picLocks noChangeAspect="1"/>
+              </p:cNvPicPr>
+              <p:nvPr/>
+            </p:nvPicPr>
+            <p:blipFill>
+              <a:blip r:embed="rId3">
+                <a:extLst>
+                  <a:ext uri="{BEBA8EAE-BF5A-486C-A8C5-ECC9F3942E4B}">
+                    <a14:imgProps xmlns:a14="http://schemas.microsoft.com/office/drawing/2010/main">
+                      <a14:imgLayer r:embed="rId4">
+                        <a14:imgEffect>
+                          <a14:saturation sat="0"/>
+                        </a14:imgEffect>
+                      </a14:imgLayer>
+                    </a14:imgProps>
+                  </a:ext>
+                  <a:ext uri="{28A0092B-C50C-407E-A947-70E740481C1C}">
+                    <a14:useLocalDpi xmlns:a14="http://schemas.microsoft.com/office/drawing/2010/main" val="0"/>
+                  </a:ext>
+                </a:extLst>
+              </a:blip>
+              <a:stretch>
+                <a:fillRect/>
+              </a:stretch>
+            </p:blipFill>
+            <p:spPr>
+              <a:xfrm>
+                <a:off x="2331350" y="1289920"/>
+                <a:ext cx="366736" cy="366736"/>
+              </a:xfrm>
+              <a:prstGeom prst="rect">
+                <a:avLst/>
+              </a:prstGeom>
+            </p:spPr>
+          </p:pic>
+          <p:sp>
+            <p:nvSpPr>
+              <p:cNvPr id="152" name="Rectangle 151"/>
+              <p:cNvSpPr/>
+              <p:nvPr/>
+            </p:nvSpPr>
+            <p:spPr>
+              <a:xfrm>
+                <a:off x="1178825" y="1252602"/>
+                <a:ext cx="1519261" cy="1493734"/>
+              </a:xfrm>
+              <a:prstGeom prst="rect">
+                <a:avLst/>
+              </a:prstGeom>
+              <a:noFill/>
+              <a:ln>
+                <a:prstDash val="dash"/>
+              </a:ln>
+            </p:spPr>
+            <p:style>
+              <a:lnRef idx="2">
+                <a:schemeClr val="accent1">
+                  <a:shade val="50000"/>
+                </a:schemeClr>
+              </a:lnRef>
+              <a:fillRef idx="1">
+                <a:schemeClr val="accent1"/>
+              </a:fillRef>
+              <a:effectRef idx="0">
+                <a:schemeClr val="accent1"/>
+              </a:effectRef>
+              <a:fontRef idx="minor">
+                <a:schemeClr val="lt1"/>
+              </a:fontRef>
+            </p:style>
+            <p:txBody>
+              <a:bodyPr rtlCol="0" anchor="ctr"/>
+              <a:lstStyle/>
+              <a:p>
+                <a:pPr algn="ctr"/>
+                <a:endParaRPr lang="en-US"/>
+              </a:p>
+            </p:txBody>
+          </p:sp>
+          <p:sp>
+            <p:nvSpPr>
+              <p:cNvPr id="153" name="TextBox 152"/>
+              <p:cNvSpPr txBox="1"/>
+              <p:nvPr/>
+            </p:nvSpPr>
+            <p:spPr>
+              <a:xfrm>
+                <a:off x="1192576" y="1203571"/>
+                <a:ext cx="1531619" cy="307777"/>
+              </a:xfrm>
+              <a:prstGeom prst="rect">
+                <a:avLst/>
+              </a:prstGeom>
+              <a:noFill/>
+            </p:spPr>
+            <p:txBody>
+              <a:bodyPr wrap="square" rtlCol="0">
+                <a:spAutoFit/>
+              </a:bodyPr>
+              <a:lstStyle/>
+              <a:p>
+                <a:r>
+                  <a:rPr lang="en-US" sz="1400" dirty="0">
+                    <a:solidFill>
+                      <a:schemeClr val="tx1">
+                        <a:lumMod val="65000"/>
+                        <a:lumOff val="35000"/>
+                      </a:schemeClr>
+                    </a:solidFill>
+                  </a:rPr>
+                  <a:t>Web Subnet</a:t>
+                </a:r>
+              </a:p>
+            </p:txBody>
+          </p:sp>
+          <p:sp>
+            <p:nvSpPr>
+              <p:cNvPr id="154" name="TextBox 153"/>
+              <p:cNvSpPr txBox="1"/>
+              <p:nvPr/>
+            </p:nvSpPr>
+            <p:spPr>
+              <a:xfrm>
+                <a:off x="2266523" y="1609161"/>
+                <a:ext cx="496390" cy="307777"/>
+              </a:xfrm>
+              <a:prstGeom prst="rect">
+                <a:avLst/>
+              </a:prstGeom>
+              <a:noFill/>
+            </p:spPr>
+            <p:txBody>
+              <a:bodyPr wrap="square" rtlCol="0">
+                <a:spAutoFit/>
+              </a:bodyPr>
+              <a:lstStyle/>
+              <a:p>
+                <a:pPr algn="ctr"/>
+                <a:r>
+                  <a:rPr lang="en-US" sz="1400" dirty="0">
+                    <a:solidFill>
+                      <a:schemeClr val="tx1">
+                        <a:lumMod val="65000"/>
+                        <a:lumOff val="35000"/>
+                      </a:schemeClr>
+                    </a:solidFill>
+                  </a:rPr>
+                  <a:t>NSG</a:t>
+                </a:r>
+              </a:p>
+            </p:txBody>
+          </p:sp>
+        </p:grpSp>
+        <p:grpSp>
+          <p:nvGrpSpPr>
+            <p:cNvPr id="121" name="Group 120"/>
+            <p:cNvGrpSpPr/>
+            <p:nvPr/>
+          </p:nvGrpSpPr>
+          <p:grpSpPr>
+            <a:xfrm>
+              <a:off x="141627" y="2138934"/>
+              <a:ext cx="2676852" cy="1519108"/>
+              <a:chOff x="4073031" y="1203571"/>
+              <a:chExt cx="2676852" cy="1519108"/>
+            </a:xfrm>
+          </p:grpSpPr>
+          <p:pic>
+            <p:nvPicPr>
+              <p:cNvPr id="141" name="Picture 140"/>
+              <p:cNvPicPr>
+                <a:picLocks noChangeAspect="1"/>
+              </p:cNvPicPr>
+              <p:nvPr/>
+            </p:nvPicPr>
+            <p:blipFill>
+              <a:blip r:embed="rId2">
+                <a:extLst>
+                  <a:ext uri="{28A0092B-C50C-407E-A947-70E740481C1C}">
+                    <a14:useLocalDpi xmlns:a14="http://schemas.microsoft.com/office/drawing/2010/main" val="0"/>
+                  </a:ext>
+                </a:extLst>
+              </a:blip>
+              <a:stretch>
+                <a:fillRect/>
+              </a:stretch>
+            </p:blipFill>
+            <p:spPr>
+              <a:xfrm>
+                <a:off x="5586911" y="1691924"/>
+                <a:ext cx="569612" cy="569612"/>
+              </a:xfrm>
+              <a:prstGeom prst="rect">
+                <a:avLst/>
+              </a:prstGeom>
+            </p:spPr>
+          </p:pic>
+          <p:sp>
+            <p:nvSpPr>
+              <p:cNvPr id="142" name="TextBox 141"/>
+              <p:cNvSpPr txBox="1"/>
+              <p:nvPr/>
+            </p:nvSpPr>
+            <p:spPr>
+              <a:xfrm>
+                <a:off x="5232213" y="2199459"/>
+                <a:ext cx="1368481" cy="523220"/>
+              </a:xfrm>
+              <a:prstGeom prst="rect">
+                <a:avLst/>
+              </a:prstGeom>
+              <a:noFill/>
+            </p:spPr>
+            <p:txBody>
+              <a:bodyPr wrap="square" rtlCol="0">
+                <a:spAutoFit/>
+              </a:bodyPr>
+              <a:lstStyle/>
+              <a:p>
+                <a:pPr algn="ctr"/>
+                <a:r>
+                  <a:rPr lang="en-US" sz="1400" dirty="0">
+                    <a:solidFill>
+                      <a:schemeClr val="tx1">
+                        <a:lumMod val="65000"/>
+                        <a:lumOff val="35000"/>
+                      </a:schemeClr>
+                    </a:solidFill>
+                  </a:rPr>
+                  <a:t>Virtual Machine Scale Set</a:t>
+                </a:r>
+              </a:p>
+            </p:txBody>
+          </p:sp>
+          <p:pic>
+            <p:nvPicPr>
+              <p:cNvPr id="143" name="Picture 142"/>
+              <p:cNvPicPr>
+                <a:picLocks noChangeAspect="1"/>
+              </p:cNvPicPr>
+              <p:nvPr/>
+            </p:nvPicPr>
+            <p:blipFill>
+              <a:blip r:embed="rId3">
+                <a:extLst>
+                  <a:ext uri="{BEBA8EAE-BF5A-486C-A8C5-ECC9F3942E4B}">
+                    <a14:imgProps xmlns:a14="http://schemas.microsoft.com/office/drawing/2010/main">
+                      <a14:imgLayer r:embed="rId4">
+                        <a14:imgEffect>
+                          <a14:saturation sat="0"/>
+                        </a14:imgEffect>
+                      </a14:imgLayer>
+                    </a14:imgProps>
+                  </a:ext>
+                  <a:ext uri="{28A0092B-C50C-407E-A947-70E740481C1C}">
+                    <a14:useLocalDpi xmlns:a14="http://schemas.microsoft.com/office/drawing/2010/main" val="0"/>
+                  </a:ext>
+                </a:extLst>
+              </a:blip>
+              <a:stretch>
+                <a:fillRect/>
+              </a:stretch>
+            </p:blipFill>
+            <p:spPr>
+              <a:xfrm>
+                <a:off x="6318320" y="1278890"/>
+                <a:ext cx="366736" cy="366736"/>
+              </a:xfrm>
+              <a:prstGeom prst="rect">
+                <a:avLst/>
+              </a:prstGeom>
+            </p:spPr>
+          </p:pic>
+          <p:sp>
+            <p:nvSpPr>
+              <p:cNvPr id="144" name="Rectangle 143"/>
+              <p:cNvSpPr/>
+              <p:nvPr/>
+            </p:nvSpPr>
+            <p:spPr>
+              <a:xfrm>
+                <a:off x="4176265" y="1228945"/>
+                <a:ext cx="2507145" cy="1493734"/>
+              </a:xfrm>
+              <a:prstGeom prst="rect">
+                <a:avLst/>
+              </a:prstGeom>
+              <a:noFill/>
+              <a:ln>
+                <a:prstDash val="dash"/>
+              </a:ln>
+            </p:spPr>
+            <p:style>
+              <a:lnRef idx="2">
+                <a:schemeClr val="accent1">
+                  <a:shade val="50000"/>
+                </a:schemeClr>
+              </a:lnRef>
+              <a:fillRef idx="1">
+                <a:schemeClr val="accent1"/>
+              </a:fillRef>
+              <a:effectRef idx="0">
+                <a:schemeClr val="accent1"/>
+              </a:effectRef>
+              <a:fontRef idx="minor">
+                <a:schemeClr val="lt1"/>
+              </a:fontRef>
+            </p:style>
+            <p:txBody>
+              <a:bodyPr rtlCol="0" anchor="ctr"/>
+              <a:lstStyle/>
+              <a:p>
+                <a:pPr algn="ctr"/>
+                <a:endParaRPr lang="en-US"/>
+              </a:p>
+            </p:txBody>
+          </p:sp>
+          <p:sp>
+            <p:nvSpPr>
+              <p:cNvPr id="145" name="TextBox 144"/>
+              <p:cNvSpPr txBox="1"/>
+              <p:nvPr/>
+            </p:nvSpPr>
+            <p:spPr>
+              <a:xfrm>
+                <a:off x="4190016" y="1203571"/>
+                <a:ext cx="1531619" cy="307777"/>
+              </a:xfrm>
+              <a:prstGeom prst="rect">
+                <a:avLst/>
+              </a:prstGeom>
+              <a:noFill/>
+            </p:spPr>
+            <p:txBody>
+              <a:bodyPr wrap="square" rtlCol="0">
+                <a:spAutoFit/>
+              </a:bodyPr>
+              <a:lstStyle/>
+              <a:p>
+                <a:r>
+                  <a:rPr lang="en-US" sz="1400" dirty="0">
+                    <a:solidFill>
+                      <a:schemeClr val="tx1">
+                        <a:lumMod val="65000"/>
+                        <a:lumOff val="35000"/>
+                      </a:schemeClr>
+                    </a:solidFill>
+                  </a:rPr>
+                  <a:t>Biz Subnet</a:t>
+                </a:r>
+              </a:p>
+            </p:txBody>
+          </p:sp>
+          <p:sp>
+            <p:nvSpPr>
+              <p:cNvPr id="146" name="TextBox 145"/>
+              <p:cNvSpPr txBox="1"/>
+              <p:nvPr/>
+            </p:nvSpPr>
+            <p:spPr>
+              <a:xfrm>
+                <a:off x="6253493" y="1598131"/>
+                <a:ext cx="496390" cy="307777"/>
+              </a:xfrm>
+              <a:prstGeom prst="rect">
+                <a:avLst/>
+              </a:prstGeom>
+              <a:noFill/>
+            </p:spPr>
+            <p:txBody>
+              <a:bodyPr wrap="square" rtlCol="0">
+                <a:spAutoFit/>
+              </a:bodyPr>
+              <a:lstStyle/>
+              <a:p>
+                <a:pPr algn="ctr"/>
+                <a:r>
+                  <a:rPr lang="en-US" sz="1400" dirty="0">
+                    <a:solidFill>
+                      <a:schemeClr val="tx1">
+                        <a:lumMod val="65000"/>
+                        <a:lumOff val="35000"/>
+                      </a:schemeClr>
+                    </a:solidFill>
+                  </a:rPr>
+                  <a:t>NSG</a:t>
+                </a:r>
+              </a:p>
+            </p:txBody>
+          </p:sp>
+          <p:pic>
+            <p:nvPicPr>
+              <p:cNvPr id="147" name="Picture 146"/>
+              <p:cNvPicPr>
+                <a:picLocks noChangeAspect="1"/>
+              </p:cNvPicPr>
+              <p:nvPr/>
+            </p:nvPicPr>
+            <p:blipFill>
+              <a:blip r:embed="rId5">
+                <a:extLst>
+                  <a:ext uri="{28A0092B-C50C-407E-A947-70E740481C1C}">
+                    <a14:useLocalDpi xmlns:a14="http://schemas.microsoft.com/office/drawing/2010/main" val="0"/>
+                  </a:ext>
+                </a:extLst>
+              </a:blip>
+              <a:stretch>
+                <a:fillRect/>
+              </a:stretch>
+            </p:blipFill>
+            <p:spPr>
+              <a:xfrm>
+                <a:off x="4419434" y="1691924"/>
+                <a:ext cx="565900" cy="565900"/>
+              </a:xfrm>
+              <a:prstGeom prst="rect">
+                <a:avLst/>
+              </a:prstGeom>
+            </p:spPr>
+          </p:pic>
+          <p:sp>
+            <p:nvSpPr>
+              <p:cNvPr id="148" name="TextBox 147"/>
+              <p:cNvSpPr txBox="1"/>
+              <p:nvPr/>
+            </p:nvSpPr>
+            <p:spPr>
+              <a:xfrm>
+                <a:off x="4073031" y="2199459"/>
+                <a:ext cx="1279006" cy="523220"/>
+              </a:xfrm>
+              <a:prstGeom prst="rect">
+                <a:avLst/>
+              </a:prstGeom>
+              <a:noFill/>
+            </p:spPr>
+            <p:txBody>
+              <a:bodyPr wrap="square" rtlCol="0">
+                <a:spAutoFit/>
+              </a:bodyPr>
+              <a:lstStyle/>
+              <a:p>
+                <a:pPr algn="ctr"/>
+                <a:r>
+                  <a:rPr lang="en-US" sz="1400" dirty="0">
+                    <a:solidFill>
+                      <a:schemeClr val="tx1">
+                        <a:lumMod val="65000"/>
+                        <a:lumOff val="35000"/>
+                      </a:schemeClr>
+                    </a:solidFill>
+                  </a:rPr>
+                  <a:t>Internal Load Balancer</a:t>
+                </a:r>
+              </a:p>
+            </p:txBody>
+          </p:sp>
+        </p:grpSp>
+        <p:grpSp>
+          <p:nvGrpSpPr>
+            <p:cNvPr id="122" name="Group 121"/>
+            <p:cNvGrpSpPr/>
+            <p:nvPr/>
+          </p:nvGrpSpPr>
+          <p:grpSpPr>
+            <a:xfrm>
+              <a:off x="4312887" y="2626652"/>
+              <a:ext cx="1039249" cy="1030755"/>
+              <a:chOff x="3976888" y="4348907"/>
+              <a:chExt cx="1039249" cy="1030755"/>
+            </a:xfrm>
+          </p:grpSpPr>
+          <p:pic>
+            <p:nvPicPr>
+              <p:cNvPr id="139" name="Picture 138"/>
+              <p:cNvPicPr>
+                <a:picLocks noChangeAspect="1"/>
+              </p:cNvPicPr>
+              <p:nvPr/>
+            </p:nvPicPr>
+            <p:blipFill>
+              <a:blip r:embed="rId5">
+                <a:extLst>
+                  <a:ext uri="{28A0092B-C50C-407E-A947-70E740481C1C}">
+                    <a14:useLocalDpi xmlns:a14="http://schemas.microsoft.com/office/drawing/2010/main" val="0"/>
+                  </a:ext>
+                </a:extLst>
+              </a:blip>
+              <a:stretch>
+                <a:fillRect/>
+              </a:stretch>
+            </p:blipFill>
+            <p:spPr>
+              <a:xfrm>
+                <a:off x="4213563" y="4348907"/>
+                <a:ext cx="565900" cy="565900"/>
+              </a:xfrm>
+              <a:prstGeom prst="rect">
+                <a:avLst/>
+              </a:prstGeom>
+            </p:spPr>
+          </p:pic>
+          <p:sp>
+            <p:nvSpPr>
+              <p:cNvPr id="140" name="TextBox 139"/>
+              <p:cNvSpPr txBox="1"/>
+              <p:nvPr/>
+            </p:nvSpPr>
+            <p:spPr>
+              <a:xfrm>
+                <a:off x="3976888" y="4856442"/>
+                <a:ext cx="1039249" cy="523220"/>
+              </a:xfrm>
+              <a:prstGeom prst="rect">
+                <a:avLst/>
+              </a:prstGeom>
+              <a:noFill/>
+            </p:spPr>
+            <p:txBody>
+              <a:bodyPr wrap="square" rtlCol="0">
+                <a:spAutoFit/>
+              </a:bodyPr>
+              <a:lstStyle/>
+              <a:p>
+                <a:pPr algn="ctr"/>
+                <a:r>
+                  <a:rPr lang="en-US" sz="1400" dirty="0">
+                    <a:solidFill>
+                      <a:schemeClr val="tx1">
+                        <a:lumMod val="65000"/>
+                        <a:lumOff val="35000"/>
+                      </a:schemeClr>
+                    </a:solidFill>
+                  </a:rPr>
+                  <a:t>Public Load Balancer</a:t>
+                </a:r>
+              </a:p>
+            </p:txBody>
+          </p:sp>
+        </p:grpSp>
+        <p:grpSp>
+          <p:nvGrpSpPr>
+            <p:cNvPr id="123" name="Group 122"/>
+            <p:cNvGrpSpPr/>
+            <p:nvPr/>
+          </p:nvGrpSpPr>
+          <p:grpSpPr>
+            <a:xfrm>
+              <a:off x="2785589" y="3674013"/>
+              <a:ext cx="1616473" cy="1326762"/>
+              <a:chOff x="4150783" y="2977678"/>
+              <a:chExt cx="1616473" cy="1326762"/>
+            </a:xfrm>
+          </p:grpSpPr>
+          <p:pic>
+            <p:nvPicPr>
+              <p:cNvPr id="133" name="Picture 132"/>
+              <p:cNvPicPr>
+                <a:picLocks noChangeAspect="1"/>
+              </p:cNvPicPr>
+              <p:nvPr/>
+            </p:nvPicPr>
+            <p:blipFill>
+              <a:blip r:embed="rId6">
+                <a:extLst>
+                  <a:ext uri="{28A0092B-C50C-407E-A947-70E740481C1C}">
+                    <a14:useLocalDpi xmlns:a14="http://schemas.microsoft.com/office/drawing/2010/main" val="0"/>
+                  </a:ext>
+                </a:extLst>
+              </a:blip>
+              <a:stretch>
+                <a:fillRect/>
+              </a:stretch>
+            </p:blipFill>
+            <p:spPr>
+              <a:xfrm>
+                <a:off x="4548977" y="3496535"/>
+                <a:ext cx="569612" cy="569612"/>
+              </a:xfrm>
+              <a:prstGeom prst="rect">
+                <a:avLst/>
+              </a:prstGeom>
+            </p:spPr>
+          </p:pic>
+          <p:sp>
+            <p:nvSpPr>
+              <p:cNvPr id="134" name="TextBox 133"/>
+              <p:cNvSpPr txBox="1"/>
+              <p:nvPr/>
+            </p:nvSpPr>
+            <p:spPr>
+              <a:xfrm>
+                <a:off x="4150783" y="3996663"/>
+                <a:ext cx="1368481" cy="307777"/>
+              </a:xfrm>
+              <a:prstGeom prst="rect">
+                <a:avLst/>
+              </a:prstGeom>
+              <a:noFill/>
+            </p:spPr>
+            <p:txBody>
+              <a:bodyPr wrap="square" rtlCol="0">
+                <a:spAutoFit/>
+              </a:bodyPr>
+              <a:lstStyle/>
+              <a:p>
+                <a:pPr algn="ctr"/>
+                <a:r>
+                  <a:rPr lang="en-US" sz="1400" dirty="0" err="1">
+                    <a:solidFill>
+                      <a:schemeClr val="tx1">
+                        <a:lumMod val="65000"/>
+                        <a:lumOff val="35000"/>
+                      </a:schemeClr>
+                    </a:solidFill>
+                  </a:rPr>
+                  <a:t>Jumpbox</a:t>
+                </a:r>
+                <a:endParaRPr lang="en-US" sz="1400" dirty="0">
+                  <a:solidFill>
+                    <a:schemeClr val="tx1">
+                      <a:lumMod val="65000"/>
+                      <a:lumOff val="35000"/>
+                    </a:schemeClr>
+                  </a:solidFill>
+                </a:endParaRPr>
+              </a:p>
+            </p:txBody>
+          </p:sp>
+          <p:pic>
+            <p:nvPicPr>
+              <p:cNvPr id="135" name="Picture 134"/>
+              <p:cNvPicPr>
+                <a:picLocks noChangeAspect="1"/>
+              </p:cNvPicPr>
+              <p:nvPr/>
+            </p:nvPicPr>
+            <p:blipFill>
+              <a:blip r:embed="rId3">
+                <a:extLst>
+                  <a:ext uri="{BEBA8EAE-BF5A-486C-A8C5-ECC9F3942E4B}">
+                    <a14:imgProps xmlns:a14="http://schemas.microsoft.com/office/drawing/2010/main">
+                      <a14:imgLayer r:embed="rId4">
+                        <a14:imgEffect>
+                          <a14:saturation sat="0"/>
+                        </a14:imgEffect>
+                      </a14:imgLayer>
+                    </a14:imgProps>
+                  </a:ext>
+                  <a:ext uri="{28A0092B-C50C-407E-A947-70E740481C1C}">
+                    <a14:useLocalDpi xmlns:a14="http://schemas.microsoft.com/office/drawing/2010/main" val="0"/>
+                  </a:ext>
+                </a:extLst>
+              </a:blip>
+              <a:stretch>
+                <a:fillRect/>
+              </a:stretch>
+            </p:blipFill>
+            <p:spPr>
+              <a:xfrm>
+                <a:off x="5335693" y="3064027"/>
+                <a:ext cx="366736" cy="366736"/>
+              </a:xfrm>
+              <a:prstGeom prst="rect">
+                <a:avLst/>
+              </a:prstGeom>
+            </p:spPr>
+          </p:pic>
+          <p:sp>
+            <p:nvSpPr>
+              <p:cNvPr id="136" name="Rectangle 135"/>
+              <p:cNvSpPr/>
+              <p:nvPr/>
+            </p:nvSpPr>
+            <p:spPr>
+              <a:xfrm>
+                <a:off x="4183168" y="3026709"/>
+                <a:ext cx="1519261" cy="1277731"/>
+              </a:xfrm>
+              <a:prstGeom prst="rect">
+                <a:avLst/>
+              </a:prstGeom>
+              <a:noFill/>
+              <a:ln>
+                <a:prstDash val="dash"/>
+              </a:ln>
+            </p:spPr>
+            <p:style>
+              <a:lnRef idx="2">
+                <a:schemeClr val="accent1">
+                  <a:shade val="50000"/>
+                </a:schemeClr>
+              </a:lnRef>
+              <a:fillRef idx="1">
+                <a:schemeClr val="accent1"/>
+              </a:fillRef>
+              <a:effectRef idx="0">
+                <a:schemeClr val="accent1"/>
+              </a:effectRef>
+              <a:fontRef idx="minor">
+                <a:schemeClr val="lt1"/>
+              </a:fontRef>
+            </p:style>
+            <p:txBody>
+              <a:bodyPr rtlCol="0" anchor="ctr"/>
+              <a:lstStyle/>
+              <a:p>
+                <a:pPr algn="ctr"/>
+                <a:endParaRPr lang="en-US"/>
+              </a:p>
+            </p:txBody>
+          </p:sp>
+          <p:sp>
+            <p:nvSpPr>
+              <p:cNvPr id="137" name="TextBox 136"/>
+              <p:cNvSpPr txBox="1"/>
+              <p:nvPr/>
+            </p:nvSpPr>
+            <p:spPr>
+              <a:xfrm>
+                <a:off x="4196919" y="2977678"/>
+                <a:ext cx="1531619" cy="307777"/>
+              </a:xfrm>
+              <a:prstGeom prst="rect">
+                <a:avLst/>
+              </a:prstGeom>
+              <a:noFill/>
+            </p:spPr>
+            <p:txBody>
+              <a:bodyPr wrap="square" rtlCol="0">
+                <a:spAutoFit/>
+              </a:bodyPr>
+              <a:lstStyle/>
+              <a:p>
+                <a:r>
+                  <a:rPr lang="en-US" sz="1400" dirty="0" err="1">
+                    <a:solidFill>
+                      <a:schemeClr val="tx1">
+                        <a:lumMod val="65000"/>
+                        <a:lumOff val="35000"/>
+                      </a:schemeClr>
+                    </a:solidFill>
+                  </a:rPr>
+                  <a:t>Mgmt</a:t>
+                </a:r>
+                <a:r>
+                  <a:rPr lang="en-US" sz="1400" dirty="0">
+                    <a:solidFill>
+                      <a:schemeClr val="tx1">
+                        <a:lumMod val="65000"/>
+                        <a:lumOff val="35000"/>
+                      </a:schemeClr>
+                    </a:solidFill>
+                  </a:rPr>
+                  <a:t> Subnet</a:t>
+                </a:r>
+              </a:p>
+            </p:txBody>
+          </p:sp>
+          <p:sp>
+            <p:nvSpPr>
+              <p:cNvPr id="138" name="TextBox 137"/>
+              <p:cNvSpPr txBox="1"/>
+              <p:nvPr/>
+            </p:nvSpPr>
+            <p:spPr>
+              <a:xfrm>
+                <a:off x="5270866" y="3383268"/>
+                <a:ext cx="496390" cy="307777"/>
+              </a:xfrm>
+              <a:prstGeom prst="rect">
+                <a:avLst/>
+              </a:prstGeom>
+              <a:noFill/>
+            </p:spPr>
+            <p:txBody>
+              <a:bodyPr wrap="square" rtlCol="0">
+                <a:spAutoFit/>
+              </a:bodyPr>
+              <a:lstStyle/>
+              <a:p>
+                <a:pPr algn="ctr"/>
+                <a:r>
+                  <a:rPr lang="en-US" sz="1400" dirty="0">
+                    <a:solidFill>
+                      <a:schemeClr val="tx1">
+                        <a:lumMod val="65000"/>
+                        <a:lumOff val="35000"/>
+                      </a:schemeClr>
+                    </a:solidFill>
+                  </a:rPr>
+                  <a:t>NSG</a:t>
+                </a:r>
+              </a:p>
+            </p:txBody>
+          </p:sp>
+        </p:grpSp>
+        <p:grpSp>
+          <p:nvGrpSpPr>
+            <p:cNvPr id="124" name="Group 123"/>
+            <p:cNvGrpSpPr/>
+            <p:nvPr/>
+          </p:nvGrpSpPr>
+          <p:grpSpPr>
+            <a:xfrm>
+              <a:off x="83014" y="5118910"/>
+              <a:ext cx="1344799" cy="1026504"/>
+              <a:chOff x="3201075" y="3395797"/>
+              <a:chExt cx="1344799" cy="1026504"/>
+            </a:xfrm>
+          </p:grpSpPr>
+          <p:pic>
+            <p:nvPicPr>
+              <p:cNvPr id="131" name="Picture 130"/>
+              <p:cNvPicPr>
+                <a:picLocks noChangeAspect="1"/>
+              </p:cNvPicPr>
+              <p:nvPr/>
+            </p:nvPicPr>
+            <p:blipFill>
+              <a:blip r:embed="rId7">
+                <a:extLst>
+                  <a:ext uri="{28A0092B-C50C-407E-A947-70E740481C1C}">
+                    <a14:useLocalDpi xmlns:a14="http://schemas.microsoft.com/office/drawing/2010/main" val="0"/>
+                  </a:ext>
+                </a:extLst>
+              </a:blip>
+              <a:stretch>
+                <a:fillRect/>
+              </a:stretch>
+            </p:blipFill>
+            <p:spPr>
+              <a:xfrm>
+                <a:off x="3588668" y="3395797"/>
+                <a:ext cx="569612" cy="569612"/>
+              </a:xfrm>
+              <a:prstGeom prst="rect">
+                <a:avLst/>
+              </a:prstGeom>
+            </p:spPr>
+          </p:pic>
+          <p:sp>
+            <p:nvSpPr>
+              <p:cNvPr id="132" name="TextBox 131"/>
+              <p:cNvSpPr txBox="1"/>
+              <p:nvPr/>
+            </p:nvSpPr>
+            <p:spPr>
+              <a:xfrm>
+                <a:off x="3201075" y="3899081"/>
+                <a:ext cx="1344799" cy="523220"/>
+              </a:xfrm>
+              <a:prstGeom prst="rect">
+                <a:avLst/>
+              </a:prstGeom>
+              <a:noFill/>
+            </p:spPr>
+            <p:txBody>
+              <a:bodyPr wrap="square" rtlCol="0">
+                <a:spAutoFit/>
+              </a:bodyPr>
+              <a:lstStyle/>
+              <a:p>
+                <a:pPr algn="ctr"/>
+                <a:r>
+                  <a:rPr lang="en-US" sz="1400" dirty="0">
+                    <a:solidFill>
+                      <a:schemeClr val="tx1">
+                        <a:lumMod val="65000"/>
+                        <a:lumOff val="35000"/>
+                      </a:schemeClr>
+                    </a:solidFill>
+                  </a:rPr>
+                  <a:t>Document DB</a:t>
+                </a:r>
+              </a:p>
+              <a:p>
+                <a:pPr algn="ctr"/>
+                <a:r>
+                  <a:rPr lang="en-US" sz="1400" dirty="0">
+                    <a:solidFill>
+                      <a:schemeClr val="tx1">
+                        <a:lumMod val="65000"/>
+                        <a:lumOff val="35000"/>
+                      </a:schemeClr>
+                    </a:solidFill>
+                  </a:rPr>
+                  <a:t>(Mongo DB API)</a:t>
+                </a:r>
+              </a:p>
+            </p:txBody>
+          </p:sp>
+        </p:grpSp>
+        <p:grpSp>
+          <p:nvGrpSpPr>
+            <p:cNvPr id="125" name="Group 124"/>
+            <p:cNvGrpSpPr/>
+            <p:nvPr/>
+          </p:nvGrpSpPr>
+          <p:grpSpPr>
+            <a:xfrm>
+              <a:off x="1633849" y="5118910"/>
+              <a:ext cx="1344799" cy="811061"/>
+              <a:chOff x="4726134" y="3395797"/>
+              <a:chExt cx="1344799" cy="811061"/>
+            </a:xfrm>
+          </p:grpSpPr>
+          <p:pic>
+            <p:nvPicPr>
+              <p:cNvPr id="129" name="Picture 128"/>
+              <p:cNvPicPr>
+                <a:picLocks noChangeAspect="1"/>
+              </p:cNvPicPr>
+              <p:nvPr/>
+            </p:nvPicPr>
+            <p:blipFill>
+              <a:blip r:embed="rId8">
+                <a:extLst>
+                  <a:ext uri="{28A0092B-C50C-407E-A947-70E740481C1C}">
+                    <a14:useLocalDpi xmlns:a14="http://schemas.microsoft.com/office/drawing/2010/main" val="0"/>
+                  </a:ext>
+                </a:extLst>
+              </a:blip>
+              <a:stretch>
+                <a:fillRect/>
+              </a:stretch>
+            </p:blipFill>
+            <p:spPr>
+              <a:xfrm>
+                <a:off x="5128787" y="3395797"/>
+                <a:ext cx="569612" cy="569612"/>
+              </a:xfrm>
+              <a:prstGeom prst="rect">
+                <a:avLst/>
+              </a:prstGeom>
+            </p:spPr>
+          </p:pic>
+          <p:sp>
+            <p:nvSpPr>
+              <p:cNvPr id="130" name="TextBox 129"/>
+              <p:cNvSpPr txBox="1"/>
+              <p:nvPr/>
+            </p:nvSpPr>
+            <p:spPr>
+              <a:xfrm>
+                <a:off x="4726134" y="3899081"/>
+                <a:ext cx="1344799" cy="307777"/>
+              </a:xfrm>
+              <a:prstGeom prst="rect">
+                <a:avLst/>
+              </a:prstGeom>
+              <a:noFill/>
+            </p:spPr>
+            <p:txBody>
+              <a:bodyPr wrap="square" rtlCol="0">
+                <a:spAutoFit/>
+              </a:bodyPr>
+              <a:lstStyle/>
+              <a:p>
+                <a:pPr algn="ctr"/>
+                <a:r>
+                  <a:rPr lang="en-US" sz="1400" dirty="0" err="1">
+                    <a:solidFill>
+                      <a:schemeClr val="tx1">
+                        <a:lumMod val="65000"/>
+                        <a:lumOff val="35000"/>
+                      </a:schemeClr>
+                    </a:solidFill>
+                  </a:rPr>
+                  <a:t>Redis</a:t>
+                </a:r>
+                <a:r>
+                  <a:rPr lang="en-US" sz="1400" dirty="0">
+                    <a:solidFill>
+                      <a:schemeClr val="tx1">
+                        <a:lumMod val="65000"/>
+                        <a:lumOff val="35000"/>
+                      </a:schemeClr>
+                    </a:solidFill>
+                  </a:rPr>
+                  <a:t> Cache</a:t>
+                </a:r>
+              </a:p>
+            </p:txBody>
+          </p:sp>
+        </p:grpSp>
+        <p:grpSp>
+          <p:nvGrpSpPr>
+            <p:cNvPr id="126" name="Group 125"/>
+            <p:cNvGrpSpPr/>
+            <p:nvPr/>
+          </p:nvGrpSpPr>
+          <p:grpSpPr>
+            <a:xfrm>
+              <a:off x="3095059" y="5108672"/>
+              <a:ext cx="1082556" cy="1026504"/>
+              <a:chOff x="1450913" y="3395797"/>
+              <a:chExt cx="1082556" cy="1026504"/>
+            </a:xfrm>
+          </p:grpSpPr>
+          <p:pic>
+            <p:nvPicPr>
+              <p:cNvPr id="127" name="Picture 126"/>
+              <p:cNvPicPr>
+                <a:picLocks noChangeAspect="1"/>
+              </p:cNvPicPr>
+              <p:nvPr/>
+            </p:nvPicPr>
+            <p:blipFill>
+              <a:blip r:embed="rId9">
+                <a:extLst>
+                  <a:ext uri="{28A0092B-C50C-407E-A947-70E740481C1C}">
+                    <a14:useLocalDpi xmlns:a14="http://schemas.microsoft.com/office/drawing/2010/main" val="0"/>
+                  </a:ext>
+                </a:extLst>
+              </a:blip>
+              <a:stretch>
+                <a:fillRect/>
+              </a:stretch>
+            </p:blipFill>
+            <p:spPr>
+              <a:xfrm>
+                <a:off x="1707385" y="3395797"/>
+                <a:ext cx="569612" cy="569612"/>
+              </a:xfrm>
+              <a:prstGeom prst="rect">
+                <a:avLst/>
+              </a:prstGeom>
+            </p:spPr>
+          </p:pic>
+          <p:sp>
+            <p:nvSpPr>
+              <p:cNvPr id="128" name="TextBox 127"/>
+              <p:cNvSpPr txBox="1"/>
+              <p:nvPr/>
+            </p:nvSpPr>
+            <p:spPr>
+              <a:xfrm>
+                <a:off x="1450913" y="3899081"/>
+                <a:ext cx="1082556" cy="523220"/>
+              </a:xfrm>
+              <a:prstGeom prst="rect">
+                <a:avLst/>
+              </a:prstGeom>
+              <a:noFill/>
+            </p:spPr>
+            <p:txBody>
+              <a:bodyPr wrap="square" rtlCol="0">
+                <a:spAutoFit/>
+              </a:bodyPr>
+              <a:lstStyle/>
+              <a:p>
+                <a:pPr algn="ctr"/>
+                <a:r>
+                  <a:rPr lang="en-US" sz="1400" dirty="0">
+                    <a:solidFill>
+                      <a:schemeClr val="tx1">
+                        <a:lumMod val="65000"/>
+                        <a:lumOff val="35000"/>
+                      </a:schemeClr>
+                    </a:solidFill>
+                  </a:rPr>
+                  <a:t>Application Insights</a:t>
+                </a:r>
+              </a:p>
+            </p:txBody>
+          </p:sp>
+        </p:grpSp>
+      </p:grpSp>
+      <p:grpSp>
+        <p:nvGrpSpPr>
+          <p:cNvPr id="158" name="Group 157"/>
+          <p:cNvGrpSpPr/>
+          <p:nvPr/>
+        </p:nvGrpSpPr>
+        <p:grpSpPr>
+          <a:xfrm>
+            <a:off x="5743014" y="4576521"/>
+            <a:ext cx="721884" cy="813985"/>
+            <a:chOff x="5585175" y="4864299"/>
+            <a:chExt cx="721884" cy="813985"/>
+          </a:xfrm>
+        </p:grpSpPr>
+        <p:pic>
+          <p:nvPicPr>
+            <p:cNvPr id="156" name="Picture 155"/>
+            <p:cNvPicPr>
+              <a:picLocks noChangeAspect="1"/>
+            </p:cNvPicPr>
+            <p:nvPr/>
+          </p:nvPicPr>
+          <p:blipFill>
+            <a:blip r:embed="rId12">
+              <a:extLst>
+                <a:ext uri="{28A0092B-C50C-407E-A947-70E740481C1C}">
+                  <a14:useLocalDpi xmlns:a14="http://schemas.microsoft.com/office/drawing/2010/main" val="0"/>
+                </a:ext>
+              </a:extLst>
+            </a:blip>
+            <a:stretch>
+              <a:fillRect/>
+            </a:stretch>
+          </p:blipFill>
+          <p:spPr>
+            <a:xfrm>
+              <a:off x="5665532" y="4864299"/>
+              <a:ext cx="569612" cy="569612"/>
+            </a:xfrm>
+            <a:prstGeom prst="rect">
+              <a:avLst/>
+            </a:prstGeom>
+          </p:spPr>
+        </p:pic>
+        <p:sp>
+          <p:nvSpPr>
+            <p:cNvPr id="157" name="TextBox 156"/>
+            <p:cNvSpPr txBox="1"/>
+            <p:nvPr/>
+          </p:nvSpPr>
+          <p:spPr>
+            <a:xfrm>
+              <a:off x="5585175" y="5370507"/>
+              <a:ext cx="721884" cy="307777"/>
+            </a:xfrm>
+            <a:prstGeom prst="rect">
+              <a:avLst/>
+            </a:prstGeom>
+            <a:noFill/>
+          </p:spPr>
+          <p:txBody>
+            <a:bodyPr wrap="square" rtlCol="0">
+              <a:spAutoFit/>
+            </a:bodyPr>
+            <a:lstStyle/>
+            <a:p>
+              <a:pPr algn="ctr"/>
+              <a:r>
+                <a:rPr lang="en-US" sz="1400" dirty="0">
+                  <a:solidFill>
+                    <a:schemeClr val="tx1">
+                      <a:lumMod val="65000"/>
+                      <a:lumOff val="35000"/>
+                    </a:schemeClr>
+                  </a:solidFill>
+                </a:rPr>
+                <a:t>Admin</a:t>
+              </a:r>
+            </a:p>
+          </p:txBody>
+        </p:sp>
+      </p:grpSp>
+      <p:cxnSp>
+        <p:nvCxnSpPr>
+          <p:cNvPr id="163" name="Connector: Elbow 162"/>
+          <p:cNvCxnSpPr>
+            <a:cxnSpLocks/>
+            <a:stCxn id="94" idx="3"/>
+            <a:endCxn id="60" idx="1"/>
+          </p:cNvCxnSpPr>
+          <p:nvPr/>
+        </p:nvCxnSpPr>
+        <p:spPr>
+          <a:xfrm>
+            <a:off x="6389365" y="2100811"/>
+            <a:ext cx="695489" cy="808791"/>
+          </a:xfrm>
+          <a:prstGeom prst="bentConnector3">
+            <a:avLst>
+              <a:gd name="adj1" fmla="val 50000"/>
+            </a:avLst>
+          </a:prstGeom>
+          <a:ln w="15875">
+            <a:headEnd type="triangle"/>
+            <a:tailEnd type="triangle"/>
+          </a:ln>
+        </p:spPr>
+        <p:style>
+          <a:lnRef idx="1">
+            <a:schemeClr val="accent1"/>
+          </a:lnRef>
+          <a:fillRef idx="0">
+            <a:schemeClr val="accent1"/>
+          </a:fillRef>
+          <a:effectRef idx="0">
+            <a:schemeClr val="accent1"/>
+          </a:effectRef>
+          <a:fontRef idx="minor">
+            <a:schemeClr val="tx1"/>
+          </a:fontRef>
+        </p:style>
+      </p:cxnSp>
+      <p:cxnSp>
+        <p:nvCxnSpPr>
+          <p:cNvPr id="166" name="Connector: Elbow 165"/>
+          <p:cNvCxnSpPr>
+            <a:cxnSpLocks/>
+            <a:stCxn id="94" idx="1"/>
+            <a:endCxn id="139" idx="3"/>
+          </p:cNvCxnSpPr>
+          <p:nvPr/>
+        </p:nvCxnSpPr>
+        <p:spPr>
+          <a:xfrm rot="10800000" flipV="1">
+            <a:off x="5136363" y="2100810"/>
+            <a:ext cx="683391" cy="808791"/>
+          </a:xfrm>
+          <a:prstGeom prst="bentConnector3">
+            <a:avLst>
+              <a:gd name="adj1" fmla="val 50000"/>
+            </a:avLst>
+          </a:prstGeom>
+          <a:ln w="15875">
+            <a:headEnd type="triangle"/>
+            <a:tailEnd type="triangle"/>
+          </a:ln>
+        </p:spPr>
+        <p:style>
+          <a:lnRef idx="1">
+            <a:schemeClr val="accent1"/>
+          </a:lnRef>
+          <a:fillRef idx="0">
+            <a:schemeClr val="accent1"/>
+          </a:fillRef>
+          <a:effectRef idx="0">
+            <a:schemeClr val="accent1"/>
+          </a:effectRef>
+          <a:fontRef idx="minor">
+            <a:schemeClr val="tx1"/>
+          </a:fontRef>
+        </p:style>
+      </p:cxnSp>
+      <p:cxnSp>
+        <p:nvCxnSpPr>
+          <p:cNvPr id="169" name="Straight Arrow Connector 168"/>
+          <p:cNvCxnSpPr>
+            <a:cxnSpLocks/>
+            <a:stCxn id="94" idx="0"/>
+            <a:endCxn id="109" idx="2"/>
+          </p:cNvCxnSpPr>
+          <p:nvPr/>
+        </p:nvCxnSpPr>
+        <p:spPr>
+          <a:xfrm flipH="1" flipV="1">
+            <a:off x="6102004" y="1317199"/>
+            <a:ext cx="2555" cy="498806"/>
+          </a:xfrm>
+          <a:prstGeom prst="straightConnector1">
+            <a:avLst/>
+          </a:prstGeom>
+          <a:ln w="15875">
+            <a:headEnd type="triangle"/>
+            <a:tailEnd type="triangle"/>
+          </a:ln>
+        </p:spPr>
+        <p:style>
+          <a:lnRef idx="1">
+            <a:schemeClr val="accent1"/>
+          </a:lnRef>
+          <a:fillRef idx="0">
+            <a:schemeClr val="accent1"/>
+          </a:fillRef>
+          <a:effectRef idx="0">
+            <a:schemeClr val="accent1"/>
+          </a:effectRef>
+          <a:fontRef idx="minor">
+            <a:schemeClr val="tx1"/>
+          </a:fontRef>
+        </p:style>
+      </p:cxnSp>
+      <p:cxnSp>
+        <p:nvCxnSpPr>
+          <p:cNvPr id="174" name="Connector: Elbow 173"/>
+          <p:cNvCxnSpPr>
+            <a:cxnSpLocks/>
+            <a:stCxn id="156" idx="3"/>
+            <a:endCxn id="64" idx="1"/>
+          </p:cNvCxnSpPr>
+          <p:nvPr/>
+        </p:nvCxnSpPr>
+        <p:spPr>
+          <a:xfrm flipV="1">
+            <a:off x="6392983" y="4477676"/>
+            <a:ext cx="1835829" cy="383651"/>
+          </a:xfrm>
+          <a:prstGeom prst="bentConnector3">
+            <a:avLst>
+              <a:gd name="adj1" fmla="val 50000"/>
+            </a:avLst>
+          </a:prstGeom>
+          <a:ln w="15875">
+            <a:headEnd type="triangle"/>
+            <a:tailEnd type="triangle"/>
+          </a:ln>
+        </p:spPr>
+        <p:style>
+          <a:lnRef idx="1">
+            <a:schemeClr val="accent1"/>
+          </a:lnRef>
+          <a:fillRef idx="0">
+            <a:schemeClr val="accent1"/>
+          </a:fillRef>
+          <a:effectRef idx="0">
+            <a:schemeClr val="accent1"/>
+          </a:effectRef>
+          <a:fontRef idx="minor">
+            <a:schemeClr val="tx1"/>
+          </a:fontRef>
+        </p:style>
+      </p:cxnSp>
+      <p:cxnSp>
+        <p:nvCxnSpPr>
+          <p:cNvPr id="177" name="Connector: Elbow 176"/>
+          <p:cNvCxnSpPr>
+            <a:cxnSpLocks/>
+            <a:stCxn id="156" idx="1"/>
+            <a:endCxn id="133" idx="3"/>
+          </p:cNvCxnSpPr>
+          <p:nvPr/>
+        </p:nvCxnSpPr>
+        <p:spPr>
+          <a:xfrm rot="10800000">
+            <a:off x="3774295" y="4477677"/>
+            <a:ext cx="2049076" cy="383651"/>
+          </a:xfrm>
+          <a:prstGeom prst="bentConnector3">
+            <a:avLst>
+              <a:gd name="adj1" fmla="val 50000"/>
+            </a:avLst>
+          </a:prstGeom>
+          <a:ln w="15875">
+            <a:headEnd type="triangle"/>
+            <a:tailEnd type="triangle"/>
+          </a:ln>
+        </p:spPr>
+        <p:style>
+          <a:lnRef idx="1">
+            <a:schemeClr val="accent1"/>
+          </a:lnRef>
+          <a:fillRef idx="0">
+            <a:schemeClr val="accent1"/>
+          </a:fillRef>
+          <a:effectRef idx="0">
+            <a:schemeClr val="accent1"/>
+          </a:effectRef>
+          <a:fontRef idx="minor">
+            <a:schemeClr val="tx1"/>
+          </a:fontRef>
+        </p:style>
+      </p:cxnSp>
+      <p:cxnSp>
+        <p:nvCxnSpPr>
+          <p:cNvPr id="180" name="Straight Arrow Connector 179"/>
+          <p:cNvCxnSpPr>
+            <a:cxnSpLocks/>
+            <a:stCxn id="60" idx="3"/>
+            <a:endCxn id="16" idx="1"/>
+          </p:cNvCxnSpPr>
+          <p:nvPr/>
+        </p:nvCxnSpPr>
+        <p:spPr>
+          <a:xfrm>
+            <a:off x="7650754" y="2909602"/>
+            <a:ext cx="534562" cy="1000"/>
+          </a:xfrm>
+          <a:prstGeom prst="straightConnector1">
+            <a:avLst/>
+          </a:prstGeom>
+          <a:ln w="15875">
+            <a:headEnd type="triangle"/>
+            <a:tailEnd type="triangle"/>
+          </a:ln>
+        </p:spPr>
+        <p:style>
+          <a:lnRef idx="1">
+            <a:schemeClr val="accent1"/>
+          </a:lnRef>
+          <a:fillRef idx="0">
+            <a:schemeClr val="accent1"/>
+          </a:fillRef>
+          <a:effectRef idx="0">
+            <a:schemeClr val="accent1"/>
+          </a:effectRef>
+          <a:fontRef idx="minor">
+            <a:schemeClr val="tx1"/>
+          </a:fontRef>
+        </p:style>
+      </p:cxnSp>
+      <p:cxnSp>
+        <p:nvCxnSpPr>
+          <p:cNvPr id="183" name="Straight Arrow Connector 182"/>
+          <p:cNvCxnSpPr>
+            <a:cxnSpLocks/>
+            <a:stCxn id="16" idx="3"/>
+            <a:endCxn id="31" idx="1"/>
+          </p:cNvCxnSpPr>
+          <p:nvPr/>
+        </p:nvCxnSpPr>
+        <p:spPr>
+          <a:xfrm flipV="1">
+            <a:off x="8754928" y="2909602"/>
+            <a:ext cx="933576" cy="1000"/>
+          </a:xfrm>
+          <a:prstGeom prst="straightConnector1">
+            <a:avLst/>
+          </a:prstGeom>
+          <a:ln w="15875">
+            <a:headEnd type="triangle"/>
+            <a:tailEnd type="triangle"/>
+          </a:ln>
+        </p:spPr>
+        <p:style>
+          <a:lnRef idx="1">
+            <a:schemeClr val="accent1"/>
+          </a:lnRef>
+          <a:fillRef idx="0">
+            <a:schemeClr val="accent1"/>
+          </a:fillRef>
+          <a:effectRef idx="0">
+            <a:schemeClr val="accent1"/>
+          </a:effectRef>
+          <a:fontRef idx="minor">
+            <a:schemeClr val="tx1"/>
+          </a:fontRef>
+        </p:style>
+      </p:cxnSp>
+      <p:cxnSp>
+        <p:nvCxnSpPr>
+          <p:cNvPr id="186" name="Straight Arrow Connector 185"/>
+          <p:cNvCxnSpPr>
+            <a:cxnSpLocks/>
+            <a:stCxn id="31" idx="3"/>
+            <a:endCxn id="25" idx="1"/>
+          </p:cNvCxnSpPr>
+          <p:nvPr/>
+        </p:nvCxnSpPr>
+        <p:spPr>
+          <a:xfrm>
+            <a:off x="10254404" y="2909602"/>
+            <a:ext cx="601577" cy="1856"/>
+          </a:xfrm>
+          <a:prstGeom prst="straightConnector1">
+            <a:avLst/>
+          </a:prstGeom>
+          <a:ln w="15875">
+            <a:headEnd type="triangle"/>
+            <a:tailEnd type="triangle"/>
+          </a:ln>
+        </p:spPr>
+        <p:style>
+          <a:lnRef idx="1">
+            <a:schemeClr val="accent1"/>
+          </a:lnRef>
+          <a:fillRef idx="0">
+            <a:schemeClr val="accent1"/>
+          </a:fillRef>
+          <a:effectRef idx="0">
+            <a:schemeClr val="accent1"/>
+          </a:effectRef>
+          <a:fontRef idx="minor">
+            <a:schemeClr val="tx1"/>
+          </a:fontRef>
+        </p:style>
+      </p:cxnSp>
+      <p:cxnSp>
+        <p:nvCxnSpPr>
+          <p:cNvPr id="189" name="Straight Arrow Connector 188"/>
+          <p:cNvCxnSpPr>
+            <a:cxnSpLocks/>
+            <a:stCxn id="139" idx="1"/>
+            <a:endCxn id="149" idx="3"/>
+          </p:cNvCxnSpPr>
+          <p:nvPr/>
+        </p:nvCxnSpPr>
+        <p:spPr>
+          <a:xfrm flipH="1">
+            <a:off x="3730792" y="2909602"/>
+            <a:ext cx="839670" cy="1000"/>
+          </a:xfrm>
+          <a:prstGeom prst="straightConnector1">
+            <a:avLst/>
+          </a:prstGeom>
+          <a:ln w="15875">
+            <a:headEnd type="triangle"/>
+            <a:tailEnd type="triangle"/>
+          </a:ln>
+        </p:spPr>
+        <p:style>
+          <a:lnRef idx="1">
+            <a:schemeClr val="accent1"/>
+          </a:lnRef>
+          <a:fillRef idx="0">
+            <a:schemeClr val="accent1"/>
+          </a:fillRef>
+          <a:effectRef idx="0">
+            <a:schemeClr val="accent1"/>
+          </a:effectRef>
+          <a:fontRef idx="minor">
+            <a:schemeClr val="tx1"/>
+          </a:fontRef>
+        </p:style>
+      </p:cxnSp>
+      <p:cxnSp>
+        <p:nvCxnSpPr>
+          <p:cNvPr id="192" name="Straight Arrow Connector 191"/>
+          <p:cNvCxnSpPr>
+            <a:cxnSpLocks/>
+            <a:stCxn id="149" idx="1"/>
+            <a:endCxn id="141" idx="3"/>
+          </p:cNvCxnSpPr>
+          <p:nvPr/>
+        </p:nvCxnSpPr>
+        <p:spPr>
+          <a:xfrm flipH="1">
+            <a:off x="2246019" y="2910602"/>
+            <a:ext cx="915161" cy="1491"/>
+          </a:xfrm>
+          <a:prstGeom prst="straightConnector1">
+            <a:avLst/>
+          </a:prstGeom>
+          <a:ln w="15875">
+            <a:headEnd type="triangle"/>
+            <a:tailEnd type="triangle"/>
+          </a:ln>
+        </p:spPr>
+        <p:style>
+          <a:lnRef idx="1">
+            <a:schemeClr val="accent1"/>
+          </a:lnRef>
+          <a:fillRef idx="0">
+            <a:schemeClr val="accent1"/>
+          </a:fillRef>
+          <a:effectRef idx="0">
+            <a:schemeClr val="accent1"/>
+          </a:effectRef>
+          <a:fontRef idx="minor">
+            <a:schemeClr val="tx1"/>
+          </a:fontRef>
+        </p:style>
+      </p:cxnSp>
+      <p:cxnSp>
+        <p:nvCxnSpPr>
+          <p:cNvPr id="195" name="Straight Arrow Connector 194"/>
+          <p:cNvCxnSpPr>
+            <a:cxnSpLocks/>
+            <a:stCxn id="141" idx="1"/>
+            <a:endCxn id="147" idx="3"/>
+          </p:cNvCxnSpPr>
+          <p:nvPr/>
+        </p:nvCxnSpPr>
+        <p:spPr>
+          <a:xfrm flipH="1" flipV="1">
+            <a:off x="1074830" y="2910237"/>
+            <a:ext cx="601577" cy="1856"/>
+          </a:xfrm>
+          <a:prstGeom prst="straightConnector1">
+            <a:avLst/>
+          </a:prstGeom>
+          <a:ln w="15875">
+            <a:headEnd type="triangle"/>
+            <a:tailEnd type="triangle"/>
+          </a:ln>
+        </p:spPr>
+        <p:style>
+          <a:lnRef idx="1">
+            <a:schemeClr val="accent1"/>
+          </a:lnRef>
+          <a:fillRef idx="0">
+            <a:schemeClr val="accent1"/>
+          </a:fillRef>
+          <a:effectRef idx="0">
+            <a:schemeClr val="accent1"/>
+          </a:effectRef>
+          <a:fontRef idx="minor">
+            <a:schemeClr val="tx1"/>
+          </a:fontRef>
+        </p:style>
+      </p:cxnSp>
+    </p:spTree>
+    <p:extLst>
+      <p:ext uri="{BB962C8B-B14F-4D97-AF65-F5344CB8AC3E}">
+        <p14:creationId xmlns:p14="http://schemas.microsoft.com/office/powerpoint/2010/main" val="1469060696"/>
       </p:ext>
     </p:extLst>
   </p:cSld>

</xml_diff>

<commit_message>
Correct biz tier subnet in sessoin 3 architecture diagram.
</commit_message>
<xml_diff>
--- a/AzureX.pptx
+++ b/AzureX.pptx
@@ -6492,10 +6492,10 @@
           </p:nvGrpSpPr>
           <p:grpSpPr>
             <a:xfrm>
-              <a:off x="141627" y="2138934"/>
-              <a:ext cx="2676852" cy="1519108"/>
-              <a:chOff x="4073031" y="1203571"/>
-              <a:chExt cx="2676852" cy="1519108"/>
+              <a:off x="244861" y="2138934"/>
+              <a:ext cx="2590488" cy="1519594"/>
+              <a:chOff x="4176265" y="1203571"/>
+              <a:chExt cx="2590488" cy="1519594"/>
             </a:xfrm>
           </p:grpSpPr>
           <p:pic>
@@ -6520,7 +6520,7 @@
             </p:blipFill>
             <p:spPr>
               <a:xfrm>
-                <a:off x="5586911" y="1691924"/>
+                <a:off x="4581576" y="1690190"/>
                 <a:ext cx="569612" cy="569612"/>
               </a:xfrm>
               <a:prstGeom prst="rect">
@@ -6536,7 +6536,7 @@
             </p:nvSpPr>
             <p:spPr>
               <a:xfrm>
-                <a:off x="5232213" y="2199459"/>
+                <a:off x="4226878" y="2197725"/>
                 <a:ext cx="1368481" cy="523220"/>
               </a:xfrm>
               <a:prstGeom prst="rect">
@@ -6743,7 +6743,7 @@
             </p:blipFill>
             <p:spPr>
               <a:xfrm>
-                <a:off x="4419434" y="1691924"/>
+                <a:off x="5834150" y="1692410"/>
                 <a:ext cx="565900" cy="565900"/>
               </a:xfrm>
               <a:prstGeom prst="rect">
@@ -6759,7 +6759,7 @@
             </p:nvSpPr>
             <p:spPr>
               <a:xfrm>
-                <a:off x="4073031" y="2199459"/>
+                <a:off x="5487747" y="2199945"/>
                 <a:ext cx="1279006" cy="523220"/>
               </a:xfrm>
               <a:prstGeom prst="rect">
@@ -7838,14 +7838,14 @@
           <p:cNvCxnSpPr>
             <a:cxnSpLocks/>
             <a:stCxn id="149" idx="1"/>
-            <a:endCxn id="141" idx="3"/>
+            <a:endCxn id="147" idx="3"/>
           </p:cNvCxnSpPr>
           <p:nvPr/>
         </p:nvCxnSpPr>
         <p:spPr>
           <a:xfrm flipH="1">
-            <a:off x="2246019" y="2910602"/>
-            <a:ext cx="915161" cy="1491"/>
+            <a:off x="2489546" y="2910602"/>
+            <a:ext cx="671634" cy="121"/>
           </a:xfrm>
           <a:prstGeom prst="straightConnector1">
             <a:avLst/>
@@ -7875,15 +7875,15 @@
           <p:cNvPr id="195" name="Straight Arrow Connector 194"/>
           <p:cNvCxnSpPr>
             <a:cxnSpLocks/>
-            <a:stCxn id="141" idx="1"/>
-            <a:endCxn id="147" idx="3"/>
+            <a:stCxn id="147" idx="1"/>
+            <a:endCxn id="141" idx="3"/>
           </p:cNvCxnSpPr>
           <p:nvPr/>
         </p:nvCxnSpPr>
         <p:spPr>
           <a:xfrm flipH="1" flipV="1">
-            <a:off x="1074830" y="2910237"/>
-            <a:ext cx="601577" cy="1856"/>
+            <a:off x="1240684" y="2910359"/>
+            <a:ext cx="682962" cy="364"/>
           </a:xfrm>
           <a:prstGeom prst="straightConnector1">
             <a:avLst/>

</xml_diff>

<commit_message>
Add storage account to support app functionality to architecture diagrams.
</commit_message>
<xml_diff>
--- a/AzureX.pptx
+++ b/AzureX.pptx
@@ -242,7 +242,7 @@
           <a:p>
             <a:fld id="{4215C990-A328-409D-95CF-76DFE9640D99}" type="datetimeFigureOut">
               <a:rPr lang="en-US" smtClean="0"/>
-              <a:t>2/16/2017</a:t>
+              <a:t>2/22/2017</a:t>
             </a:fld>
             <a:endParaRPr lang="en-US"/>
           </a:p>
@@ -410,7 +410,7 @@
           <a:p>
             <a:fld id="{4215C990-A328-409D-95CF-76DFE9640D99}" type="datetimeFigureOut">
               <a:rPr lang="en-US" smtClean="0"/>
-              <a:t>2/16/2017</a:t>
+              <a:t>2/22/2017</a:t>
             </a:fld>
             <a:endParaRPr lang="en-US"/>
           </a:p>
@@ -588,7 +588,7 @@
           <a:p>
             <a:fld id="{4215C990-A328-409D-95CF-76DFE9640D99}" type="datetimeFigureOut">
               <a:rPr lang="en-US" smtClean="0"/>
-              <a:t>2/16/2017</a:t>
+              <a:t>2/22/2017</a:t>
             </a:fld>
             <a:endParaRPr lang="en-US"/>
           </a:p>
@@ -756,7 +756,7 @@
           <a:p>
             <a:fld id="{4215C990-A328-409D-95CF-76DFE9640D99}" type="datetimeFigureOut">
               <a:rPr lang="en-US" smtClean="0"/>
-              <a:t>2/16/2017</a:t>
+              <a:t>2/22/2017</a:t>
             </a:fld>
             <a:endParaRPr lang="en-US"/>
           </a:p>
@@ -1001,7 +1001,7 @@
           <a:p>
             <a:fld id="{4215C990-A328-409D-95CF-76DFE9640D99}" type="datetimeFigureOut">
               <a:rPr lang="en-US" smtClean="0"/>
-              <a:t>2/16/2017</a:t>
+              <a:t>2/22/2017</a:t>
             </a:fld>
             <a:endParaRPr lang="en-US"/>
           </a:p>
@@ -1230,7 +1230,7 @@
           <a:p>
             <a:fld id="{4215C990-A328-409D-95CF-76DFE9640D99}" type="datetimeFigureOut">
               <a:rPr lang="en-US" smtClean="0"/>
-              <a:t>2/16/2017</a:t>
+              <a:t>2/22/2017</a:t>
             </a:fld>
             <a:endParaRPr lang="en-US"/>
           </a:p>
@@ -1594,7 +1594,7 @@
           <a:p>
             <a:fld id="{4215C990-A328-409D-95CF-76DFE9640D99}" type="datetimeFigureOut">
               <a:rPr lang="en-US" smtClean="0"/>
-              <a:t>2/16/2017</a:t>
+              <a:t>2/22/2017</a:t>
             </a:fld>
             <a:endParaRPr lang="en-US"/>
           </a:p>
@@ -1711,7 +1711,7 @@
           <a:p>
             <a:fld id="{4215C990-A328-409D-95CF-76DFE9640D99}" type="datetimeFigureOut">
               <a:rPr lang="en-US" smtClean="0"/>
-              <a:t>2/16/2017</a:t>
+              <a:t>2/22/2017</a:t>
             </a:fld>
             <a:endParaRPr lang="en-US"/>
           </a:p>
@@ -1806,7 +1806,7 @@
           <a:p>
             <a:fld id="{4215C990-A328-409D-95CF-76DFE9640D99}" type="datetimeFigureOut">
               <a:rPr lang="en-US" smtClean="0"/>
-              <a:t>2/16/2017</a:t>
+              <a:t>2/22/2017</a:t>
             </a:fld>
             <a:endParaRPr lang="en-US"/>
           </a:p>
@@ -2081,7 +2081,7 @@
           <a:p>
             <a:fld id="{4215C990-A328-409D-95CF-76DFE9640D99}" type="datetimeFigureOut">
               <a:rPr lang="en-US" smtClean="0"/>
-              <a:t>2/16/2017</a:t>
+              <a:t>2/22/2017</a:t>
             </a:fld>
             <a:endParaRPr lang="en-US"/>
           </a:p>
@@ -2333,7 +2333,7 @@
           <a:p>
             <a:fld id="{4215C990-A328-409D-95CF-76DFE9640D99}" type="datetimeFigureOut">
               <a:rPr lang="en-US" smtClean="0"/>
-              <a:t>2/16/2017</a:t>
+              <a:t>2/22/2017</a:t>
             </a:fld>
             <a:endParaRPr lang="en-US"/>
           </a:p>
@@ -2544,7 +2544,7 @@
           <a:p>
             <a:fld id="{4215C990-A328-409D-95CF-76DFE9640D99}" type="datetimeFigureOut">
               <a:rPr lang="en-US" smtClean="0"/>
-              <a:t>2/16/2017</a:t>
+              <a:t>2/22/2017</a:t>
             </a:fld>
             <a:endParaRPr lang="en-US"/>
           </a:p>
@@ -4297,14 +4297,13 @@
           <p:cNvCxnSpPr>
             <a:cxnSpLocks/>
             <a:stCxn id="53" idx="3"/>
-            <a:endCxn id="14" idx="1"/>
           </p:cNvCxnSpPr>
           <p:nvPr/>
         </p:nvCxnSpPr>
         <p:spPr>
-          <a:xfrm flipV="1">
-            <a:off x="9223069" y="2724402"/>
-            <a:ext cx="1367442" cy="530"/>
+          <a:xfrm>
+            <a:off x="9223069" y="2724932"/>
+            <a:ext cx="1452264" cy="0"/>
           </a:xfrm>
           <a:prstGeom prst="straightConnector1">
             <a:avLst/>
@@ -4488,6 +4487,128 @@
           </a:p>
         </p:txBody>
       </p:sp>
+      <p:grpSp>
+        <p:nvGrpSpPr>
+          <p:cNvPr id="6" name="Group 5"/>
+          <p:cNvGrpSpPr/>
+          <p:nvPr/>
+        </p:nvGrpSpPr>
+        <p:grpSpPr>
+          <a:xfrm>
+            <a:off x="10352228" y="4056831"/>
+            <a:ext cx="1426500" cy="1038022"/>
+            <a:chOff x="10354884" y="4234504"/>
+            <a:chExt cx="1426500" cy="1038022"/>
+          </a:xfrm>
+        </p:grpSpPr>
+        <p:pic>
+          <p:nvPicPr>
+            <p:cNvPr id="5" name="Picture 4"/>
+            <p:cNvPicPr>
+              <a:picLocks noChangeAspect="1"/>
+            </p:cNvPicPr>
+            <p:nvPr/>
+          </p:nvPicPr>
+          <p:blipFill>
+            <a:blip r:embed="rId10">
+              <a:extLst>
+                <a:ext uri="{28A0092B-C50C-407E-A947-70E740481C1C}">
+                  <a14:useLocalDpi xmlns:a14="http://schemas.microsoft.com/office/drawing/2010/main" val="0"/>
+                </a:ext>
+              </a:extLst>
+            </a:blip>
+            <a:stretch>
+              <a:fillRect/>
+            </a:stretch>
+          </p:blipFill>
+          <p:spPr>
+            <a:xfrm>
+              <a:off x="10677989" y="4234504"/>
+              <a:ext cx="780290" cy="780290"/>
+            </a:xfrm>
+            <a:prstGeom prst="rect">
+              <a:avLst/>
+            </a:prstGeom>
+          </p:spPr>
+        </p:pic>
+        <p:sp>
+          <p:nvSpPr>
+            <p:cNvPr id="59" name="TextBox 58"/>
+            <p:cNvSpPr txBox="1"/>
+            <p:nvPr/>
+          </p:nvSpPr>
+          <p:spPr>
+            <a:xfrm>
+              <a:off x="10354884" y="4903194"/>
+              <a:ext cx="1426500" cy="369332"/>
+            </a:xfrm>
+            <a:prstGeom prst="rect">
+              <a:avLst/>
+            </a:prstGeom>
+            <a:noFill/>
+          </p:spPr>
+          <p:txBody>
+            <a:bodyPr wrap="square" rtlCol="0">
+              <a:spAutoFit/>
+            </a:bodyPr>
+            <a:lstStyle/>
+            <a:p>
+              <a:pPr algn="ctr"/>
+              <a:r>
+                <a:rPr lang="en-US" dirty="0">
+                  <a:solidFill>
+                    <a:schemeClr val="tx1">
+                      <a:lumMod val="65000"/>
+                      <a:lumOff val="35000"/>
+                    </a:schemeClr>
+                  </a:solidFill>
+                </a:rPr>
+                <a:t>App Storage</a:t>
+              </a:r>
+            </a:p>
+          </p:txBody>
+        </p:sp>
+      </p:grpSp>
+      <p:cxnSp>
+        <p:nvCxnSpPr>
+          <p:cNvPr id="60" name="Connector: Elbow 59"/>
+          <p:cNvCxnSpPr>
+            <a:cxnSpLocks/>
+            <a:stCxn id="5" idx="1"/>
+            <a:endCxn id="53" idx="3"/>
+          </p:cNvCxnSpPr>
+          <p:nvPr/>
+        </p:nvCxnSpPr>
+        <p:spPr>
+          <a:xfrm rot="10800000">
+            <a:off x="9223069" y="2724932"/>
+            <a:ext cx="1452264" cy="1722044"/>
+          </a:xfrm>
+          <a:prstGeom prst="bentConnector3">
+            <a:avLst>
+              <a:gd name="adj1" fmla="val 50000"/>
+            </a:avLst>
+          </a:prstGeom>
+          <a:ln w="15875">
+            <a:headEnd type="triangle"/>
+            <a:tailEnd type="triangle"/>
+          </a:ln>
+        </p:spPr>
+        <p:style>
+          <a:lnRef idx="1">
+            <a:schemeClr val="accent1"/>
+          </a:lnRef>
+          <a:fillRef idx="0">
+            <a:schemeClr val="accent1"/>
+          </a:fillRef>
+          <a:effectRef idx="0">
+            <a:schemeClr val="accent1"/>
+          </a:effectRef>
+          <a:fontRef idx="minor">
+            <a:schemeClr val="tx1"/>
+          </a:fontRef>
+        </p:style>
+      </p:cxnSp>
     </p:spTree>
     <p:extLst>
       <p:ext uri="{BB962C8B-B14F-4D97-AF65-F5344CB8AC3E}">
@@ -7908,6 +8029,140 @@
           </a:fontRef>
         </p:style>
       </p:cxnSp>
+      <p:pic>
+        <p:nvPicPr>
+          <p:cNvPr id="108" name="Picture 107"/>
+          <p:cNvPicPr>
+            <a:picLocks noChangeAspect="1"/>
+          </p:cNvPicPr>
+          <p:nvPr/>
+        </p:nvPicPr>
+        <p:blipFill>
+          <a:blip r:embed="rId13">
+            <a:extLst>
+              <a:ext uri="{28A0092B-C50C-407E-A947-70E740481C1C}">
+                <a14:useLocalDpi xmlns:a14="http://schemas.microsoft.com/office/drawing/2010/main" val="0"/>
+              </a:ext>
+            </a:extLst>
+          </a:blip>
+          <a:stretch>
+            <a:fillRect/>
+          </a:stretch>
+        </p:blipFill>
+        <p:spPr>
+          <a:xfrm>
+            <a:off x="4506064" y="5161416"/>
+            <a:ext cx="569612" cy="569612"/>
+          </a:xfrm>
+          <a:prstGeom prst="rect">
+            <a:avLst/>
+          </a:prstGeom>
+        </p:spPr>
+      </p:pic>
+      <p:sp>
+        <p:nvSpPr>
+          <p:cNvPr id="112" name="TextBox 111"/>
+          <p:cNvSpPr txBox="1"/>
+          <p:nvPr/>
+        </p:nvSpPr>
+        <p:spPr>
+          <a:xfrm>
+            <a:off x="4237495" y="5608881"/>
+            <a:ext cx="1099339" cy="307777"/>
+          </a:xfrm>
+          <a:prstGeom prst="rect">
+            <a:avLst/>
+          </a:prstGeom>
+          <a:noFill/>
+        </p:spPr>
+        <p:txBody>
+          <a:bodyPr wrap="square" rtlCol="0">
+            <a:spAutoFit/>
+          </a:bodyPr>
+          <a:lstStyle/>
+          <a:p>
+            <a:pPr algn="ctr"/>
+            <a:r>
+              <a:rPr lang="en-US" sz="1400" dirty="0">
+                <a:solidFill>
+                  <a:schemeClr val="tx1">
+                    <a:lumMod val="65000"/>
+                    <a:lumOff val="35000"/>
+                  </a:schemeClr>
+                </a:solidFill>
+              </a:rPr>
+              <a:t>App Storage</a:t>
+            </a:r>
+          </a:p>
+        </p:txBody>
+      </p:sp>
+      <p:pic>
+        <p:nvPicPr>
+          <p:cNvPr id="115" name="Picture 114"/>
+          <p:cNvPicPr>
+            <a:picLocks noChangeAspect="1"/>
+          </p:cNvPicPr>
+          <p:nvPr/>
+        </p:nvPicPr>
+        <p:blipFill>
+          <a:blip r:embed="rId13">
+            <a:extLst>
+              <a:ext uri="{28A0092B-C50C-407E-A947-70E740481C1C}">
+                <a14:useLocalDpi xmlns:a14="http://schemas.microsoft.com/office/drawing/2010/main" val="0"/>
+              </a:ext>
+            </a:extLst>
+          </a:blip>
+          <a:stretch>
+            <a:fillRect/>
+          </a:stretch>
+        </p:blipFill>
+        <p:spPr>
+          <a:xfrm>
+            <a:off x="7193340" y="5154516"/>
+            <a:ext cx="569612" cy="569612"/>
+          </a:xfrm>
+          <a:prstGeom prst="rect">
+            <a:avLst/>
+          </a:prstGeom>
+        </p:spPr>
+      </p:pic>
+      <p:sp>
+        <p:nvSpPr>
+          <p:cNvPr id="155" name="TextBox 154"/>
+          <p:cNvSpPr txBox="1"/>
+          <p:nvPr/>
+        </p:nvSpPr>
+        <p:spPr>
+          <a:xfrm>
+            <a:off x="6924771" y="5601981"/>
+            <a:ext cx="1099339" cy="307777"/>
+          </a:xfrm>
+          <a:prstGeom prst="rect">
+            <a:avLst/>
+          </a:prstGeom>
+          <a:noFill/>
+        </p:spPr>
+        <p:txBody>
+          <a:bodyPr wrap="square" rtlCol="0">
+            <a:spAutoFit/>
+          </a:bodyPr>
+          <a:lstStyle/>
+          <a:p>
+            <a:pPr algn="ctr"/>
+            <a:r>
+              <a:rPr lang="en-US" sz="1400" dirty="0">
+                <a:solidFill>
+                  <a:schemeClr val="tx1">
+                    <a:lumMod val="65000"/>
+                    <a:lumOff val="35000"/>
+                  </a:schemeClr>
+                </a:solidFill>
+              </a:rPr>
+              <a:t>App Storage</a:t>
+            </a:r>
+          </a:p>
+        </p:txBody>
+      </p:sp>
     </p:spTree>
     <p:extLst>
       <p:ext uri="{BB962C8B-B14F-4D97-AF65-F5344CB8AC3E}">

</xml_diff>